<commit_message>
Fix typos and missing stuff in ProtectPowellInBrief
</commit_message>
<xml_diff>
--- a/ProtectPowellInBrief/ProtectLakePowellInBrief-DataAssembly.pptx
+++ b/ProtectPowellInBrief/ProtectLakePowellInBrief-DataAssembly.pptx
@@ -6,6 +6,7 @@
   </p:sldMasterIdLst>
   <p:sldIdLst>
     <p:sldId id="256" r:id="rId2"/>
+    <p:sldId id="257" r:id="rId3"/>
   </p:sldIdLst>
   <p:sldSz cx="12192000" cy="6858000"/>
   <p:notesSz cx="6950075" cy="9236075"/>
@@ -5152,6 +5153,1807 @@
 </p:sld>
 </file>
 
+<file path=ppt/slides/slide2.xml><?xml version="1.0" encoding="utf-8"?>
+<p:sld xmlns:a="http://schemas.openxmlformats.org/drawingml/2006/main" xmlns:r="http://schemas.openxmlformats.org/officeDocument/2006/relationships" xmlns:p="http://schemas.openxmlformats.org/presentationml/2006/main">
+  <p:cSld>
+    <p:spTree>
+      <p:nvGrpSpPr>
+        <p:cNvPr id="1" name=""/>
+        <p:cNvGrpSpPr/>
+        <p:nvPr/>
+      </p:nvGrpSpPr>
+      <p:grpSpPr>
+        <a:xfrm>
+          <a:off x="0" y="0"/>
+          <a:ext cx="0" cy="0"/>
+          <a:chOff x="0" y="0"/>
+          <a:chExt cx="0" cy="0"/>
+        </a:xfrm>
+      </p:grpSpPr>
+      <p:sp>
+        <p:nvSpPr>
+          <p:cNvPr id="5" name="TextBox 4">
+            <a:extLst>
+              <a:ext uri="{FF2B5EF4-FFF2-40B4-BE49-F238E27FC236}">
+                <a16:creationId xmlns:a16="http://schemas.microsoft.com/office/drawing/2014/main" id="{F59BCDC2-9A10-429B-B2A0-2A34B6089359}"/>
+              </a:ext>
+            </a:extLst>
+          </p:cNvPr>
+          <p:cNvSpPr txBox="1"/>
+          <p:nvPr/>
+        </p:nvSpPr>
+        <p:spPr>
+          <a:xfrm>
+            <a:off x="9555114" y="4105189"/>
+            <a:ext cx="2302746" cy="1015663"/>
+          </a:xfrm>
+          <a:prstGeom prst="rect">
+            <a:avLst/>
+          </a:prstGeom>
+          <a:noFill/>
+        </p:spPr>
+        <p:txBody>
+          <a:bodyPr wrap="none" rtlCol="0">
+            <a:spAutoFit/>
+          </a:bodyPr>
+          <a:lstStyle/>
+          <a:p>
+            <a:pPr algn="ctr"/>
+            <a:r>
+              <a:rPr lang="en-US" sz="2000" b="1" dirty="0">
+                <a:solidFill>
+                  <a:srgbClr val="7030A0"/>
+                </a:solidFill>
+              </a:rPr>
+              <a:t>Upstream</a:t>
+            </a:r>
+          </a:p>
+          <a:p>
+            <a:pPr algn="ctr"/>
+            <a:r>
+              <a:rPr lang="en-US" sz="2000" b="1" dirty="0">
+                <a:solidFill>
+                  <a:srgbClr val="7030A0"/>
+                </a:solidFill>
+              </a:rPr>
+              <a:t>Water Conservation</a:t>
+            </a:r>
+          </a:p>
+          <a:p>
+            <a:pPr algn="ctr"/>
+            <a:r>
+              <a:rPr lang="en-US" sz="2000" dirty="0">
+                <a:solidFill>
+                  <a:srgbClr val="7030A0"/>
+                </a:solidFill>
+              </a:rPr>
+              <a:t>(0.5 </a:t>
+            </a:r>
+            <a:r>
+              <a:rPr lang="en-US" sz="2000" dirty="0" err="1">
+                <a:solidFill>
+                  <a:srgbClr val="7030A0"/>
+                </a:solidFill>
+              </a:rPr>
+              <a:t>maf</a:t>
+            </a:r>
+            <a:r>
+              <a:rPr lang="en-US" sz="2000" dirty="0">
+                <a:solidFill>
+                  <a:srgbClr val="7030A0"/>
+                </a:solidFill>
+              </a:rPr>
+              <a:t> maximum)</a:t>
+            </a:r>
+          </a:p>
+        </p:txBody>
+      </p:sp>
+      <p:sp>
+        <p:nvSpPr>
+          <p:cNvPr id="6" name="TextBox 5">
+            <a:extLst>
+              <a:ext uri="{FF2B5EF4-FFF2-40B4-BE49-F238E27FC236}">
+                <a16:creationId xmlns:a16="http://schemas.microsoft.com/office/drawing/2014/main" id="{9B2955EA-60CD-4CDE-A8AC-8E3EBD3BB8DF}"/>
+              </a:ext>
+            </a:extLst>
+          </p:cNvPr>
+          <p:cNvSpPr txBox="1"/>
+          <p:nvPr/>
+        </p:nvSpPr>
+        <p:spPr>
+          <a:xfrm>
+            <a:off x="9379130" y="2903667"/>
+            <a:ext cx="2812870" cy="1015663"/>
+          </a:xfrm>
+          <a:prstGeom prst="rect">
+            <a:avLst/>
+          </a:prstGeom>
+          <a:noFill/>
+        </p:spPr>
+        <p:txBody>
+          <a:bodyPr wrap="square" rtlCol="0">
+            <a:spAutoFit/>
+          </a:bodyPr>
+          <a:lstStyle/>
+          <a:p>
+            <a:pPr algn="ctr"/>
+            <a:r>
+              <a:rPr lang="en-US" sz="2000" b="1" dirty="0">
+                <a:solidFill>
+                  <a:srgbClr val="7030A0"/>
+                </a:solidFill>
+              </a:rPr>
+              <a:t>Inflow</a:t>
+            </a:r>
+          </a:p>
+          <a:p>
+            <a:pPr algn="ctr"/>
+            <a:r>
+              <a:rPr lang="en-US" sz="2000" dirty="0">
+                <a:solidFill>
+                  <a:srgbClr val="7030A0"/>
+                </a:solidFill>
+              </a:rPr>
+              <a:t>5.2 – 6.6 </a:t>
+            </a:r>
+            <a:r>
+              <a:rPr lang="en-US" sz="2000" dirty="0" err="1">
+                <a:solidFill>
+                  <a:srgbClr val="7030A0"/>
+                </a:solidFill>
+              </a:rPr>
+              <a:t>maf</a:t>
+            </a:r>
+            <a:r>
+              <a:rPr lang="en-US" sz="2000" dirty="0">
+                <a:solidFill>
+                  <a:srgbClr val="7030A0"/>
+                </a:solidFill>
+              </a:rPr>
+              <a:t> this year</a:t>
+            </a:r>
+          </a:p>
+          <a:p>
+            <a:pPr algn="ctr"/>
+            <a:r>
+              <a:rPr lang="en-US" sz="2000" dirty="0">
+                <a:solidFill>
+                  <a:srgbClr val="7030A0"/>
+                </a:solidFill>
+              </a:rPr>
+              <a:t>(min. and most probable)</a:t>
+            </a:r>
+          </a:p>
+        </p:txBody>
+      </p:sp>
+      <p:sp>
+        <p:nvSpPr>
+          <p:cNvPr id="7" name="TextBox 6">
+            <a:extLst>
+              <a:ext uri="{FF2B5EF4-FFF2-40B4-BE49-F238E27FC236}">
+                <a16:creationId xmlns:a16="http://schemas.microsoft.com/office/drawing/2014/main" id="{3CE620A3-6192-4C4B-9163-D7C135DC9CEA}"/>
+              </a:ext>
+            </a:extLst>
+          </p:cNvPr>
+          <p:cNvSpPr txBox="1"/>
+          <p:nvPr/>
+        </p:nvSpPr>
+        <p:spPr>
+          <a:xfrm>
+            <a:off x="8095492" y="811940"/>
+            <a:ext cx="3764828" cy="1323439"/>
+          </a:xfrm>
+          <a:prstGeom prst="rect">
+            <a:avLst/>
+          </a:prstGeom>
+          <a:noFill/>
+        </p:spPr>
+        <p:txBody>
+          <a:bodyPr wrap="square" rtlCol="0">
+            <a:spAutoFit/>
+          </a:bodyPr>
+          <a:lstStyle/>
+          <a:p>
+            <a:pPr algn="ctr"/>
+            <a:r>
+              <a:rPr lang="en-US" sz="2000" b="1" dirty="0">
+                <a:solidFill>
+                  <a:srgbClr val="7030A0"/>
+                </a:solidFill>
+              </a:rPr>
+              <a:t>Drought Response Operations</a:t>
+            </a:r>
+          </a:p>
+          <a:p>
+            <a:pPr algn="ctr"/>
+            <a:r>
+              <a:rPr lang="en-US" sz="2000" dirty="0">
+                <a:solidFill>
+                  <a:srgbClr val="7030A0"/>
+                </a:solidFill>
+              </a:rPr>
+              <a:t>&lt; 1 </a:t>
+            </a:r>
+            <a:r>
+              <a:rPr lang="en-US" sz="2000" dirty="0" err="1">
+                <a:solidFill>
+                  <a:srgbClr val="7030A0"/>
+                </a:solidFill>
+              </a:rPr>
+              <a:t>maf</a:t>
+            </a:r>
+            <a:r>
+              <a:rPr lang="en-US" sz="2000" dirty="0">
+                <a:solidFill>
+                  <a:srgbClr val="7030A0"/>
+                </a:solidFill>
+              </a:rPr>
+              <a:t> movable</a:t>
+            </a:r>
+          </a:p>
+          <a:p>
+            <a:pPr algn="ctr"/>
+            <a:r>
+              <a:rPr lang="en-US" sz="2000" dirty="0">
+                <a:solidFill>
+                  <a:srgbClr val="7030A0"/>
+                </a:solidFill>
+              </a:rPr>
+              <a:t>4.5 </a:t>
+            </a:r>
+            <a:r>
+              <a:rPr lang="en-US" sz="2000" dirty="0" err="1">
+                <a:solidFill>
+                  <a:srgbClr val="7030A0"/>
+                </a:solidFill>
+              </a:rPr>
+              <a:t>maf</a:t>
+            </a:r>
+            <a:r>
+              <a:rPr lang="en-US" sz="2000" dirty="0">
+                <a:solidFill>
+                  <a:srgbClr val="7030A0"/>
+                </a:solidFill>
+              </a:rPr>
+              <a:t> storage</a:t>
+            </a:r>
+          </a:p>
+          <a:p>
+            <a:pPr algn="ctr"/>
+            <a:r>
+              <a:rPr lang="en-US" sz="2000" dirty="0">
+                <a:solidFill>
+                  <a:srgbClr val="7030A0"/>
+                </a:solidFill>
+              </a:rPr>
+              <a:t>(combined Upper Basin reservoirs)</a:t>
+            </a:r>
+          </a:p>
+        </p:txBody>
+      </p:sp>
+      <p:sp>
+        <p:nvSpPr>
+          <p:cNvPr id="8" name="TextBox 7">
+            <a:extLst>
+              <a:ext uri="{FF2B5EF4-FFF2-40B4-BE49-F238E27FC236}">
+                <a16:creationId xmlns:a16="http://schemas.microsoft.com/office/drawing/2014/main" id="{50CA89CE-C392-424B-9A31-CDED9A149034}"/>
+              </a:ext>
+            </a:extLst>
+          </p:cNvPr>
+          <p:cNvSpPr txBox="1"/>
+          <p:nvPr/>
+        </p:nvSpPr>
+        <p:spPr>
+          <a:xfrm>
+            <a:off x="4684783" y="1004112"/>
+            <a:ext cx="2618217" cy="707886"/>
+          </a:xfrm>
+          <a:prstGeom prst="rect">
+            <a:avLst/>
+          </a:prstGeom>
+          <a:noFill/>
+        </p:spPr>
+        <p:txBody>
+          <a:bodyPr wrap="none" rtlCol="0">
+            <a:spAutoFit/>
+          </a:bodyPr>
+          <a:lstStyle/>
+          <a:p>
+            <a:pPr algn="ctr"/>
+            <a:r>
+              <a:rPr lang="en-US" sz="2000" b="1" dirty="0"/>
+              <a:t>Evaporation</a:t>
+            </a:r>
+          </a:p>
+          <a:p>
+            <a:pPr algn="ctr"/>
+            <a:r>
+              <a:rPr lang="en-US" sz="2000" dirty="0"/>
+              <a:t>(0.1 – 0.4 </a:t>
+            </a:r>
+            <a:r>
+              <a:rPr lang="en-US" sz="2000" dirty="0" err="1"/>
+              <a:t>maf</a:t>
+            </a:r>
+            <a:r>
+              <a:rPr lang="en-US" sz="2000" dirty="0"/>
+              <a:t> per year)</a:t>
+            </a:r>
+          </a:p>
+        </p:txBody>
+      </p:sp>
+      <p:sp>
+        <p:nvSpPr>
+          <p:cNvPr id="9" name="TextBox 8">
+            <a:extLst>
+              <a:ext uri="{FF2B5EF4-FFF2-40B4-BE49-F238E27FC236}">
+                <a16:creationId xmlns:a16="http://schemas.microsoft.com/office/drawing/2014/main" id="{E7F1F1C5-C60E-46F6-9DAA-E004B4467E33}"/>
+              </a:ext>
+            </a:extLst>
+          </p:cNvPr>
+          <p:cNvSpPr txBox="1"/>
+          <p:nvPr/>
+        </p:nvSpPr>
+        <p:spPr>
+          <a:xfrm>
+            <a:off x="973875" y="2185815"/>
+            <a:ext cx="2397002" cy="1015663"/>
+          </a:xfrm>
+          <a:prstGeom prst="rect">
+            <a:avLst/>
+          </a:prstGeom>
+          <a:noFill/>
+        </p:spPr>
+        <p:txBody>
+          <a:bodyPr wrap="none" rtlCol="0">
+            <a:spAutoFit/>
+          </a:bodyPr>
+          <a:lstStyle/>
+          <a:p>
+            <a:pPr algn="ctr"/>
+            <a:r>
+              <a:rPr lang="en-US" sz="2000" b="1" dirty="0">
+                <a:solidFill>
+                  <a:srgbClr val="0000FF"/>
+                </a:solidFill>
+              </a:rPr>
+              <a:t>Release</a:t>
+            </a:r>
+          </a:p>
+          <a:p>
+            <a:pPr algn="ctr"/>
+            <a:r>
+              <a:rPr lang="en-US" sz="2000" dirty="0">
+                <a:solidFill>
+                  <a:srgbClr val="0000FF"/>
+                </a:solidFill>
+              </a:rPr>
+              <a:t>7 – 7.48 </a:t>
+            </a:r>
+            <a:r>
+              <a:rPr lang="en-US" sz="2000" dirty="0" err="1">
+                <a:solidFill>
+                  <a:srgbClr val="0000FF"/>
+                </a:solidFill>
+              </a:rPr>
+              <a:t>maf</a:t>
+            </a:r>
+            <a:r>
+              <a:rPr lang="en-US" sz="2000" dirty="0">
+                <a:solidFill>
+                  <a:srgbClr val="0000FF"/>
+                </a:solidFill>
+              </a:rPr>
+              <a:t> per year</a:t>
+            </a:r>
+          </a:p>
+          <a:p>
+            <a:pPr algn="ctr"/>
+            <a:r>
+              <a:rPr lang="en-US" sz="2000" dirty="0">
+                <a:solidFill>
+                  <a:srgbClr val="0000FF"/>
+                </a:solidFill>
+              </a:rPr>
+              <a:t>(Lower – Mid tier)</a:t>
+            </a:r>
+          </a:p>
+        </p:txBody>
+      </p:sp>
+      <p:sp>
+        <p:nvSpPr>
+          <p:cNvPr id="10" name="TextBox 9">
+            <a:extLst>
+              <a:ext uri="{FF2B5EF4-FFF2-40B4-BE49-F238E27FC236}">
+                <a16:creationId xmlns:a16="http://schemas.microsoft.com/office/drawing/2014/main" id="{34D905EE-E906-4CAA-9577-BAB6674C2011}"/>
+              </a:ext>
+            </a:extLst>
+          </p:cNvPr>
+          <p:cNvSpPr txBox="1"/>
+          <p:nvPr/>
+        </p:nvSpPr>
+        <p:spPr>
+          <a:xfrm>
+            <a:off x="112800" y="3547747"/>
+            <a:ext cx="4119153" cy="1323439"/>
+          </a:xfrm>
+          <a:prstGeom prst="rect">
+            <a:avLst/>
+          </a:prstGeom>
+          <a:noFill/>
+        </p:spPr>
+        <p:txBody>
+          <a:bodyPr wrap="square" rtlCol="0">
+            <a:spAutoFit/>
+          </a:bodyPr>
+          <a:lstStyle/>
+          <a:p>
+            <a:pPr algn="ctr"/>
+            <a:r>
+              <a:rPr lang="en-US" sz="2000" b="1" dirty="0">
+                <a:solidFill>
+                  <a:srgbClr val="0000FF"/>
+                </a:solidFill>
+              </a:rPr>
+              <a:t>Sustain Endangered Fish</a:t>
+            </a:r>
+          </a:p>
+          <a:p>
+            <a:pPr algn="ctr"/>
+            <a:r>
+              <a:rPr lang="en-US" sz="2000" dirty="0">
+                <a:solidFill>
+                  <a:srgbClr val="0000FF"/>
+                </a:solidFill>
+              </a:rPr>
+              <a:t>(Summer release temperature &lt; 18</a:t>
+            </a:r>
+            <a:r>
+              <a:rPr lang="en-US" sz="2000" baseline="30000" dirty="0">
+                <a:solidFill>
+                  <a:srgbClr val="0000FF"/>
+                </a:solidFill>
+              </a:rPr>
+              <a:t>o</a:t>
+            </a:r>
+            <a:r>
+              <a:rPr lang="en-US" sz="2000" dirty="0">
+                <a:solidFill>
+                  <a:srgbClr val="0000FF"/>
+                </a:solidFill>
+              </a:rPr>
+              <a:t>C)</a:t>
+            </a:r>
+          </a:p>
+          <a:p>
+            <a:pPr marL="174625" indent="-174625" algn="ctr">
+              <a:buFont typeface="Arial" panose="020B0604020202020204" pitchFamily="34" charset="0"/>
+              <a:buChar char="•"/>
+            </a:pPr>
+            <a:r>
+              <a:rPr lang="en-US" sz="2000" dirty="0">
+                <a:solidFill>
+                  <a:srgbClr val="0000FF"/>
+                </a:solidFill>
+              </a:rPr>
+              <a:t>Penstock: Powell elev. &gt; 3,525 ft.</a:t>
+            </a:r>
+          </a:p>
+          <a:p>
+            <a:pPr marL="174625" indent="-174625" algn="ctr">
+              <a:buFont typeface="Arial" panose="020B0604020202020204" pitchFamily="34" charset="0"/>
+              <a:buChar char="•"/>
+            </a:pPr>
+            <a:r>
+              <a:rPr lang="en-US" sz="2000" dirty="0">
+                <a:solidFill>
+                  <a:srgbClr val="0000FF"/>
+                </a:solidFill>
+              </a:rPr>
+              <a:t>River outlets: Powell elev. &gt; 3,425 ft. </a:t>
+            </a:r>
+          </a:p>
+        </p:txBody>
+      </p:sp>
+      <p:cxnSp>
+        <p:nvCxnSpPr>
+          <p:cNvPr id="12" name="Straight Arrow Connector 11">
+            <a:extLst>
+              <a:ext uri="{FF2B5EF4-FFF2-40B4-BE49-F238E27FC236}">
+                <a16:creationId xmlns:a16="http://schemas.microsoft.com/office/drawing/2014/main" id="{750CBE95-CA13-4809-ACF3-ACAE291CD686}"/>
+              </a:ext>
+            </a:extLst>
+          </p:cNvPr>
+          <p:cNvCxnSpPr>
+            <a:cxnSpLocks/>
+            <a:stCxn id="5" idx="1"/>
+            <a:endCxn id="33" idx="3"/>
+          </p:cNvCxnSpPr>
+          <p:nvPr/>
+        </p:nvCxnSpPr>
+        <p:spPr>
+          <a:xfrm flipH="1" flipV="1">
+            <a:off x="8438606" y="3954382"/>
+            <a:ext cx="1116508" cy="658639"/>
+          </a:xfrm>
+          <a:prstGeom prst="straightConnector1">
+            <a:avLst/>
+          </a:prstGeom>
+          <a:ln w="38100">
+            <a:tailEnd type="triangle"/>
+          </a:ln>
+        </p:spPr>
+        <p:style>
+          <a:lnRef idx="1">
+            <a:schemeClr val="dk1"/>
+          </a:lnRef>
+          <a:fillRef idx="0">
+            <a:schemeClr val="dk1"/>
+          </a:fillRef>
+          <a:effectRef idx="0">
+            <a:schemeClr val="dk1"/>
+          </a:effectRef>
+          <a:fontRef idx="minor">
+            <a:schemeClr val="tx1"/>
+          </a:fontRef>
+        </p:style>
+      </p:cxnSp>
+      <p:cxnSp>
+        <p:nvCxnSpPr>
+          <p:cNvPr id="13" name="Straight Arrow Connector 12">
+            <a:extLst>
+              <a:ext uri="{FF2B5EF4-FFF2-40B4-BE49-F238E27FC236}">
+                <a16:creationId xmlns:a16="http://schemas.microsoft.com/office/drawing/2014/main" id="{91E7C9D4-E07B-45AE-83C7-E944E85EE0E4}"/>
+              </a:ext>
+            </a:extLst>
+          </p:cNvPr>
+          <p:cNvCxnSpPr>
+            <a:cxnSpLocks/>
+            <a:stCxn id="6" idx="1"/>
+            <a:endCxn id="33" idx="3"/>
+          </p:cNvCxnSpPr>
+          <p:nvPr/>
+        </p:nvCxnSpPr>
+        <p:spPr>
+          <a:xfrm flipH="1">
+            <a:off x="8438606" y="3411499"/>
+            <a:ext cx="940524" cy="542883"/>
+          </a:xfrm>
+          <a:prstGeom prst="straightConnector1">
+            <a:avLst/>
+          </a:prstGeom>
+          <a:ln w="38100">
+            <a:tailEnd type="triangle"/>
+          </a:ln>
+        </p:spPr>
+        <p:style>
+          <a:lnRef idx="1">
+            <a:schemeClr val="dk1"/>
+          </a:lnRef>
+          <a:fillRef idx="0">
+            <a:schemeClr val="dk1"/>
+          </a:fillRef>
+          <a:effectRef idx="0">
+            <a:schemeClr val="dk1"/>
+          </a:effectRef>
+          <a:fontRef idx="minor">
+            <a:schemeClr val="tx1"/>
+          </a:fontRef>
+        </p:style>
+      </p:cxnSp>
+      <p:cxnSp>
+        <p:nvCxnSpPr>
+          <p:cNvPr id="17" name="Straight Arrow Connector 16">
+            <a:extLst>
+              <a:ext uri="{FF2B5EF4-FFF2-40B4-BE49-F238E27FC236}">
+                <a16:creationId xmlns:a16="http://schemas.microsoft.com/office/drawing/2014/main" id="{E7FF7C67-A7A1-4645-A6AA-9C912FAD9DA4}"/>
+              </a:ext>
+            </a:extLst>
+          </p:cNvPr>
+          <p:cNvCxnSpPr>
+            <a:cxnSpLocks/>
+            <a:stCxn id="7" idx="2"/>
+            <a:endCxn id="33" idx="3"/>
+          </p:cNvCxnSpPr>
+          <p:nvPr/>
+        </p:nvCxnSpPr>
+        <p:spPr>
+          <a:xfrm flipH="1">
+            <a:off x="8438606" y="2135379"/>
+            <a:ext cx="1539300" cy="1819003"/>
+          </a:xfrm>
+          <a:prstGeom prst="straightConnector1">
+            <a:avLst/>
+          </a:prstGeom>
+          <a:ln w="38100">
+            <a:tailEnd type="triangle"/>
+          </a:ln>
+        </p:spPr>
+        <p:style>
+          <a:lnRef idx="1">
+            <a:schemeClr val="dk1"/>
+          </a:lnRef>
+          <a:fillRef idx="0">
+            <a:schemeClr val="dk1"/>
+          </a:fillRef>
+          <a:effectRef idx="0">
+            <a:schemeClr val="dk1"/>
+          </a:effectRef>
+          <a:fontRef idx="minor">
+            <a:schemeClr val="tx1"/>
+          </a:fontRef>
+        </p:style>
+      </p:cxnSp>
+      <p:cxnSp>
+        <p:nvCxnSpPr>
+          <p:cNvPr id="21" name="Straight Arrow Connector 20">
+            <a:extLst>
+              <a:ext uri="{FF2B5EF4-FFF2-40B4-BE49-F238E27FC236}">
+                <a16:creationId xmlns:a16="http://schemas.microsoft.com/office/drawing/2014/main" id="{8CDB56D1-659C-4565-A7AA-A56CC4476047}"/>
+              </a:ext>
+            </a:extLst>
+          </p:cNvPr>
+          <p:cNvCxnSpPr>
+            <a:cxnSpLocks/>
+            <a:stCxn id="18" idx="0"/>
+            <a:endCxn id="8" idx="2"/>
+          </p:cNvCxnSpPr>
+          <p:nvPr/>
+        </p:nvCxnSpPr>
+        <p:spPr>
+          <a:xfrm flipH="1" flipV="1">
+            <a:off x="5993892" y="1711998"/>
+            <a:ext cx="26880" cy="750816"/>
+          </a:xfrm>
+          <a:prstGeom prst="straightConnector1">
+            <a:avLst/>
+          </a:prstGeom>
+          <a:ln w="38100">
+            <a:tailEnd type="triangle"/>
+          </a:ln>
+        </p:spPr>
+        <p:style>
+          <a:lnRef idx="1">
+            <a:schemeClr val="dk1"/>
+          </a:lnRef>
+          <a:fillRef idx="0">
+            <a:schemeClr val="dk1"/>
+          </a:fillRef>
+          <a:effectRef idx="0">
+            <a:schemeClr val="dk1"/>
+          </a:effectRef>
+          <a:fontRef idx="minor">
+            <a:schemeClr val="tx1"/>
+          </a:fontRef>
+        </p:style>
+      </p:cxnSp>
+      <p:cxnSp>
+        <p:nvCxnSpPr>
+          <p:cNvPr id="25" name="Straight Arrow Connector 24">
+            <a:extLst>
+              <a:ext uri="{FF2B5EF4-FFF2-40B4-BE49-F238E27FC236}">
+                <a16:creationId xmlns:a16="http://schemas.microsoft.com/office/drawing/2014/main" id="{3B40F6FD-7719-4696-974B-21B49B8A5D96}"/>
+              </a:ext>
+            </a:extLst>
+          </p:cNvPr>
+          <p:cNvCxnSpPr>
+            <a:cxnSpLocks/>
+            <a:stCxn id="28" idx="1"/>
+            <a:endCxn id="9" idx="3"/>
+          </p:cNvCxnSpPr>
+          <p:nvPr/>
+        </p:nvCxnSpPr>
+        <p:spPr>
+          <a:xfrm flipH="1" flipV="1">
+            <a:off x="3370877" y="2693647"/>
+            <a:ext cx="1253213" cy="850296"/>
+          </a:xfrm>
+          <a:prstGeom prst="straightConnector1">
+            <a:avLst/>
+          </a:prstGeom>
+          <a:ln w="38100">
+            <a:tailEnd type="triangle"/>
+          </a:ln>
+        </p:spPr>
+        <p:style>
+          <a:lnRef idx="1">
+            <a:schemeClr val="dk1"/>
+          </a:lnRef>
+          <a:fillRef idx="0">
+            <a:schemeClr val="dk1"/>
+          </a:fillRef>
+          <a:effectRef idx="0">
+            <a:schemeClr val="dk1"/>
+          </a:effectRef>
+          <a:fontRef idx="minor">
+            <a:schemeClr val="tx1"/>
+          </a:fontRef>
+        </p:style>
+      </p:cxnSp>
+      <p:cxnSp>
+        <p:nvCxnSpPr>
+          <p:cNvPr id="30" name="Straight Arrow Connector 29">
+            <a:extLst>
+              <a:ext uri="{FF2B5EF4-FFF2-40B4-BE49-F238E27FC236}">
+                <a16:creationId xmlns:a16="http://schemas.microsoft.com/office/drawing/2014/main" id="{0C9A1E2F-8D56-46D0-896A-9CB8021AF66D}"/>
+              </a:ext>
+            </a:extLst>
+          </p:cNvPr>
+          <p:cNvCxnSpPr>
+            <a:cxnSpLocks/>
+            <a:stCxn id="28" idx="1"/>
+            <a:endCxn id="10" idx="3"/>
+          </p:cNvCxnSpPr>
+          <p:nvPr/>
+        </p:nvCxnSpPr>
+        <p:spPr>
+          <a:xfrm flipH="1">
+            <a:off x="4231953" y="3543943"/>
+            <a:ext cx="392137" cy="665524"/>
+          </a:xfrm>
+          <a:prstGeom prst="straightConnector1">
+            <a:avLst/>
+          </a:prstGeom>
+          <a:ln w="38100">
+            <a:tailEnd type="triangle"/>
+          </a:ln>
+        </p:spPr>
+        <p:style>
+          <a:lnRef idx="1">
+            <a:schemeClr val="dk1"/>
+          </a:lnRef>
+          <a:fillRef idx="0">
+            <a:schemeClr val="dk1"/>
+          </a:fillRef>
+          <a:effectRef idx="0">
+            <a:schemeClr val="dk1"/>
+          </a:effectRef>
+          <a:fontRef idx="minor">
+            <a:schemeClr val="tx1"/>
+          </a:fontRef>
+        </p:style>
+      </p:cxnSp>
+      <p:sp>
+        <p:nvSpPr>
+          <p:cNvPr id="35" name="TextBox 34">
+            <a:extLst>
+              <a:ext uri="{FF2B5EF4-FFF2-40B4-BE49-F238E27FC236}">
+                <a16:creationId xmlns:a16="http://schemas.microsoft.com/office/drawing/2014/main" id="{B4A7D5EE-0C24-44EA-83C4-67C75320AA84}"/>
+              </a:ext>
+            </a:extLst>
+          </p:cNvPr>
+          <p:cNvSpPr txBox="1"/>
+          <p:nvPr/>
+        </p:nvSpPr>
+        <p:spPr>
+          <a:xfrm>
+            <a:off x="688637" y="5231551"/>
+            <a:ext cx="2682240" cy="830997"/>
+          </a:xfrm>
+          <a:prstGeom prst="rect">
+            <a:avLst/>
+          </a:prstGeom>
+          <a:noFill/>
+        </p:spPr>
+        <p:txBody>
+          <a:bodyPr wrap="square" rtlCol="0">
+            <a:spAutoFit/>
+          </a:bodyPr>
+          <a:lstStyle/>
+          <a:p>
+            <a:pPr algn="ctr"/>
+            <a:r>
+              <a:rPr lang="en-US" sz="1600" b="1" dirty="0"/>
+              <a:t>Values for March 30, 2022</a:t>
+            </a:r>
+          </a:p>
+          <a:p>
+            <a:pPr algn="ctr"/>
+            <a:r>
+              <a:rPr lang="en-US" sz="1600" dirty="0"/>
+              <a:t>David E. Rosenberg</a:t>
+            </a:r>
+          </a:p>
+          <a:p>
+            <a:pPr algn="ctr"/>
+            <a:r>
+              <a:rPr lang="en-US" sz="1600" dirty="0"/>
+              <a:t>Utah State University</a:t>
+            </a:r>
+          </a:p>
+        </p:txBody>
+      </p:sp>
+      <p:grpSp>
+        <p:nvGrpSpPr>
+          <p:cNvPr id="70" name="Group 69">
+            <a:extLst>
+              <a:ext uri="{FF2B5EF4-FFF2-40B4-BE49-F238E27FC236}">
+                <a16:creationId xmlns:a16="http://schemas.microsoft.com/office/drawing/2014/main" id="{867E93AE-B1CE-43D9-ABC1-E337892F2456}"/>
+              </a:ext>
+            </a:extLst>
+          </p:cNvPr>
+          <p:cNvGrpSpPr/>
+          <p:nvPr/>
+        </p:nvGrpSpPr>
+        <p:grpSpPr>
+          <a:xfrm>
+            <a:off x="4624090" y="2419880"/>
+            <a:ext cx="4119153" cy="2657782"/>
+            <a:chOff x="4754199" y="4275251"/>
+            <a:chExt cx="4119153" cy="2657782"/>
+          </a:xfrm>
+        </p:grpSpPr>
+        <p:sp>
+          <p:nvSpPr>
+            <p:cNvPr id="16" name="Trapezoid 15">
+              <a:extLst>
+                <a:ext uri="{FF2B5EF4-FFF2-40B4-BE49-F238E27FC236}">
+                  <a16:creationId xmlns:a16="http://schemas.microsoft.com/office/drawing/2014/main" id="{DE35DC4F-F19E-459F-8DA2-AE2CE4452AAA}"/>
+                </a:ext>
+              </a:extLst>
+            </p:cNvPr>
+            <p:cNvSpPr/>
+            <p:nvPr/>
+          </p:nvSpPr>
+          <p:spPr>
+            <a:xfrm rot="10800000">
+              <a:off x="5120207" y="4275251"/>
+              <a:ext cx="2051552" cy="2386799"/>
+            </a:xfrm>
+            <a:prstGeom prst="trapezoid">
+              <a:avLst>
+                <a:gd name="adj" fmla="val 26771"/>
+              </a:avLst>
+            </a:prstGeom>
+            <a:solidFill>
+              <a:schemeClr val="bg1"/>
+            </a:solidFill>
+            <a:ln>
+              <a:solidFill>
+                <a:schemeClr val="tx1"/>
+              </a:solidFill>
+            </a:ln>
+          </p:spPr>
+          <p:style>
+            <a:lnRef idx="2">
+              <a:schemeClr val="accent1">
+                <a:shade val="50000"/>
+              </a:schemeClr>
+            </a:lnRef>
+            <a:fillRef idx="1">
+              <a:schemeClr val="accent1"/>
+            </a:fillRef>
+            <a:effectRef idx="0">
+              <a:schemeClr val="accent1"/>
+            </a:effectRef>
+            <a:fontRef idx="minor">
+              <a:schemeClr val="lt1"/>
+            </a:fontRef>
+          </p:style>
+          <p:txBody>
+            <a:bodyPr rtlCol="0" anchor="ctr"/>
+            <a:lstStyle/>
+            <a:p>
+              <a:pPr algn="ctr"/>
+              <a:endParaRPr lang="en-US" dirty="0"/>
+            </a:p>
+          </p:txBody>
+        </p:sp>
+        <p:cxnSp>
+          <p:nvCxnSpPr>
+            <p:cNvPr id="20" name="Straight Connector 19">
+              <a:extLst>
+                <a:ext uri="{FF2B5EF4-FFF2-40B4-BE49-F238E27FC236}">
+                  <a16:creationId xmlns:a16="http://schemas.microsoft.com/office/drawing/2014/main" id="{D4072774-3DF5-4F9F-8173-607D03FDAFD2}"/>
+                </a:ext>
+              </a:extLst>
+            </p:cNvPr>
+            <p:cNvCxnSpPr>
+              <a:cxnSpLocks/>
+            </p:cNvCxnSpPr>
+            <p:nvPr/>
+          </p:nvCxnSpPr>
+          <p:spPr>
+            <a:xfrm>
+              <a:off x="5289830" y="5397338"/>
+              <a:ext cx="1675995" cy="0"/>
+            </a:xfrm>
+            <a:prstGeom prst="line">
+              <a:avLst/>
+            </a:prstGeom>
+            <a:ln>
+              <a:solidFill>
+                <a:schemeClr val="tx1"/>
+              </a:solidFill>
+              <a:prstDash val="dash"/>
+            </a:ln>
+          </p:spPr>
+          <p:style>
+            <a:lnRef idx="1">
+              <a:schemeClr val="accent1"/>
+            </a:lnRef>
+            <a:fillRef idx="0">
+              <a:schemeClr val="accent1"/>
+            </a:fillRef>
+            <a:effectRef idx="0">
+              <a:schemeClr val="accent1"/>
+            </a:effectRef>
+            <a:fontRef idx="minor">
+              <a:schemeClr val="tx1"/>
+            </a:fontRef>
+          </p:style>
+        </p:cxnSp>
+        <p:sp>
+          <p:nvSpPr>
+            <p:cNvPr id="28" name="Rectangle 27">
+              <a:extLst>
+                <a:ext uri="{FF2B5EF4-FFF2-40B4-BE49-F238E27FC236}">
+                  <a16:creationId xmlns:a16="http://schemas.microsoft.com/office/drawing/2014/main" id="{EDFCDF37-3AF5-42DC-871E-D72F6F08E175}"/>
+                </a:ext>
+              </a:extLst>
+            </p:cNvPr>
+            <p:cNvSpPr/>
+            <p:nvPr/>
+          </p:nvSpPr>
+          <p:spPr>
+            <a:xfrm>
+              <a:off x="4754199" y="5245425"/>
+              <a:ext cx="596637" cy="307777"/>
+            </a:xfrm>
+            <a:prstGeom prst="rect">
+              <a:avLst/>
+            </a:prstGeom>
+          </p:spPr>
+          <p:txBody>
+            <a:bodyPr wrap="none">
+              <a:spAutoFit/>
+            </a:bodyPr>
+            <a:lstStyle/>
+            <a:p>
+              <a:pPr algn="ctr"/>
+              <a:r>
+                <a:rPr lang="en-US" sz="1400" dirty="0"/>
+                <a:t>3,525</a:t>
+              </a:r>
+            </a:p>
+          </p:txBody>
+        </p:sp>
+        <p:sp>
+          <p:nvSpPr>
+            <p:cNvPr id="29" name="Rectangle 28">
+              <a:extLst>
+                <a:ext uri="{FF2B5EF4-FFF2-40B4-BE49-F238E27FC236}">
+                  <a16:creationId xmlns:a16="http://schemas.microsoft.com/office/drawing/2014/main" id="{DA9EC722-79C7-4C50-AD0D-5E070D5C0B5E}"/>
+                </a:ext>
+              </a:extLst>
+            </p:cNvPr>
+            <p:cNvSpPr/>
+            <p:nvPr/>
+          </p:nvSpPr>
+          <p:spPr>
+            <a:xfrm>
+              <a:off x="6916161" y="5246426"/>
+              <a:ext cx="1957191" cy="307777"/>
+            </a:xfrm>
+            <a:prstGeom prst="rect">
+              <a:avLst/>
+            </a:prstGeom>
+          </p:spPr>
+          <p:txBody>
+            <a:bodyPr wrap="square">
+              <a:spAutoFit/>
+            </a:bodyPr>
+            <a:lstStyle/>
+            <a:p>
+              <a:r>
+                <a:rPr lang="en-US" sz="1400" dirty="0">
+                  <a:solidFill>
+                    <a:schemeClr val="accent2"/>
+                  </a:solidFill>
+                </a:rPr>
+                <a:t>5.9 - Upper Basin target</a:t>
+              </a:r>
+            </a:p>
+          </p:txBody>
+        </p:sp>
+        <p:sp>
+          <p:nvSpPr>
+            <p:cNvPr id="32" name="Rectangle 31">
+              <a:extLst>
+                <a:ext uri="{FF2B5EF4-FFF2-40B4-BE49-F238E27FC236}">
+                  <a16:creationId xmlns:a16="http://schemas.microsoft.com/office/drawing/2014/main" id="{E7987C47-80E8-41B8-9603-BDE6398DD780}"/>
+                </a:ext>
+              </a:extLst>
+            </p:cNvPr>
+            <p:cNvSpPr/>
+            <p:nvPr/>
+          </p:nvSpPr>
+          <p:spPr>
+            <a:xfrm>
+              <a:off x="4852862" y="5670654"/>
+              <a:ext cx="595036" cy="307777"/>
+            </a:xfrm>
+            <a:prstGeom prst="rect">
+              <a:avLst/>
+            </a:prstGeom>
+          </p:spPr>
+          <p:txBody>
+            <a:bodyPr wrap="none">
+              <a:spAutoFit/>
+            </a:bodyPr>
+            <a:lstStyle/>
+            <a:p>
+              <a:pPr algn="ctr"/>
+              <a:r>
+                <a:rPr lang="en-US" sz="1400" dirty="0"/>
+                <a:t>3,490</a:t>
+              </a:r>
+            </a:p>
+          </p:txBody>
+        </p:sp>
+        <p:sp>
+          <p:nvSpPr>
+            <p:cNvPr id="33" name="Rectangle 32">
+              <a:extLst>
+                <a:ext uri="{FF2B5EF4-FFF2-40B4-BE49-F238E27FC236}">
+                  <a16:creationId xmlns:a16="http://schemas.microsoft.com/office/drawing/2014/main" id="{531B30C2-8700-4AB9-8547-D807E230D305}"/>
+                </a:ext>
+              </a:extLst>
+            </p:cNvPr>
+            <p:cNvSpPr/>
+            <p:nvPr/>
+          </p:nvSpPr>
+          <p:spPr>
+            <a:xfrm>
+              <a:off x="6802001" y="5655864"/>
+              <a:ext cx="1766714" cy="307777"/>
+            </a:xfrm>
+            <a:prstGeom prst="rect">
+              <a:avLst/>
+            </a:prstGeom>
+          </p:spPr>
+          <p:txBody>
+            <a:bodyPr wrap="square">
+              <a:spAutoFit/>
+            </a:bodyPr>
+            <a:lstStyle/>
+            <a:p>
+              <a:r>
+                <a:rPr lang="en-US" sz="1400" dirty="0">
+                  <a:solidFill>
+                    <a:schemeClr val="accent2"/>
+                  </a:solidFill>
+                </a:rPr>
+                <a:t>4.0 - Minimum power</a:t>
+              </a:r>
+            </a:p>
+          </p:txBody>
+        </p:sp>
+        <p:sp>
+          <p:nvSpPr>
+            <p:cNvPr id="36" name="Rectangle 35">
+              <a:extLst>
+                <a:ext uri="{FF2B5EF4-FFF2-40B4-BE49-F238E27FC236}">
+                  <a16:creationId xmlns:a16="http://schemas.microsoft.com/office/drawing/2014/main" id="{067785AB-65BE-4731-A355-4465EDEB56CC}"/>
+                </a:ext>
+              </a:extLst>
+            </p:cNvPr>
+            <p:cNvSpPr/>
+            <p:nvPr/>
+          </p:nvSpPr>
+          <p:spPr>
+            <a:xfrm>
+              <a:off x="4929682" y="5960637"/>
+              <a:ext cx="595036" cy="307777"/>
+            </a:xfrm>
+            <a:prstGeom prst="rect">
+              <a:avLst/>
+            </a:prstGeom>
+          </p:spPr>
+          <p:txBody>
+            <a:bodyPr wrap="none">
+              <a:spAutoFit/>
+            </a:bodyPr>
+            <a:lstStyle/>
+            <a:p>
+              <a:pPr algn="ctr"/>
+              <a:r>
+                <a:rPr lang="en-US" sz="1400" dirty="0"/>
+                <a:t>3,455</a:t>
+              </a:r>
+            </a:p>
+          </p:txBody>
+        </p:sp>
+        <p:sp>
+          <p:nvSpPr>
+            <p:cNvPr id="37" name="Rectangle 36">
+              <a:extLst>
+                <a:ext uri="{FF2B5EF4-FFF2-40B4-BE49-F238E27FC236}">
+                  <a16:creationId xmlns:a16="http://schemas.microsoft.com/office/drawing/2014/main" id="{E7360E20-8F42-4900-9453-DDAA4EB9D152}"/>
+                </a:ext>
+              </a:extLst>
+            </p:cNvPr>
+            <p:cNvSpPr/>
+            <p:nvPr/>
+          </p:nvSpPr>
+          <p:spPr>
+            <a:xfrm>
+              <a:off x="6752607" y="5945172"/>
+              <a:ext cx="1570491" cy="523220"/>
+            </a:xfrm>
+            <a:prstGeom prst="rect">
+              <a:avLst/>
+            </a:prstGeom>
+          </p:spPr>
+          <p:txBody>
+            <a:bodyPr wrap="square">
+              <a:spAutoFit/>
+            </a:bodyPr>
+            <a:lstStyle/>
+            <a:p>
+              <a:r>
+                <a:rPr lang="en-US" sz="1400" dirty="0">
+                  <a:solidFill>
+                    <a:schemeClr val="accent2"/>
+                  </a:solidFill>
+                </a:rPr>
+                <a:t>2.5 - Can’t release</a:t>
+              </a:r>
+            </a:p>
+            <a:p>
+              <a:r>
+                <a:rPr lang="en-US" sz="1400" dirty="0">
+                  <a:solidFill>
+                    <a:schemeClr val="accent2"/>
+                  </a:solidFill>
+                </a:rPr>
+                <a:t>         7.5 </a:t>
+              </a:r>
+              <a:r>
+                <a:rPr lang="en-US" sz="1400" dirty="0" err="1">
+                  <a:solidFill>
+                    <a:schemeClr val="accent2"/>
+                  </a:solidFill>
+                </a:rPr>
+                <a:t>maf</a:t>
+              </a:r>
+              <a:r>
+                <a:rPr lang="en-US" sz="1400" dirty="0">
+                  <a:solidFill>
+                    <a:schemeClr val="accent2"/>
+                  </a:solidFill>
+                </a:rPr>
+                <a:t>/year</a:t>
+              </a:r>
+            </a:p>
+          </p:txBody>
+        </p:sp>
+        <p:sp>
+          <p:nvSpPr>
+            <p:cNvPr id="40" name="Rectangle 39">
+              <a:extLst>
+                <a:ext uri="{FF2B5EF4-FFF2-40B4-BE49-F238E27FC236}">
+                  <a16:creationId xmlns:a16="http://schemas.microsoft.com/office/drawing/2014/main" id="{BCA82F22-FB25-4B8F-9208-08EFA25EB4E4}"/>
+                </a:ext>
+              </a:extLst>
+            </p:cNvPr>
+            <p:cNvSpPr/>
+            <p:nvPr/>
+          </p:nvSpPr>
+          <p:spPr>
+            <a:xfrm>
+              <a:off x="5066368" y="6416029"/>
+              <a:ext cx="595035" cy="307777"/>
+            </a:xfrm>
+            <a:prstGeom prst="rect">
+              <a:avLst/>
+            </a:prstGeom>
+          </p:spPr>
+          <p:txBody>
+            <a:bodyPr wrap="none">
+              <a:spAutoFit/>
+            </a:bodyPr>
+            <a:lstStyle/>
+            <a:p>
+              <a:pPr algn="ctr"/>
+              <a:r>
+                <a:rPr lang="en-US" sz="1400" dirty="0"/>
+                <a:t>3,370</a:t>
+              </a:r>
+            </a:p>
+          </p:txBody>
+        </p:sp>
+        <p:sp>
+          <p:nvSpPr>
+            <p:cNvPr id="41" name="Rectangle 40">
+              <a:extLst>
+                <a:ext uri="{FF2B5EF4-FFF2-40B4-BE49-F238E27FC236}">
+                  <a16:creationId xmlns:a16="http://schemas.microsoft.com/office/drawing/2014/main" id="{02316CF7-D8DF-41F4-B6F0-207B3BC581A5}"/>
+                </a:ext>
+              </a:extLst>
+            </p:cNvPr>
+            <p:cNvSpPr/>
+            <p:nvPr/>
+          </p:nvSpPr>
+          <p:spPr>
+            <a:xfrm>
+              <a:off x="6655111" y="6409813"/>
+              <a:ext cx="1570490" cy="523220"/>
+            </a:xfrm>
+            <a:prstGeom prst="rect">
+              <a:avLst/>
+            </a:prstGeom>
+          </p:spPr>
+          <p:txBody>
+            <a:bodyPr wrap="square">
+              <a:spAutoFit/>
+            </a:bodyPr>
+            <a:lstStyle/>
+            <a:p>
+              <a:r>
+                <a:rPr lang="en-US" sz="1400" dirty="0">
+                  <a:solidFill>
+                    <a:schemeClr val="accent2"/>
+                  </a:solidFill>
+                </a:rPr>
+                <a:t>0.0 - Dead pool</a:t>
+              </a:r>
+            </a:p>
+            <a:p>
+              <a:r>
+                <a:rPr lang="en-US" sz="1400" dirty="0">
+                  <a:solidFill>
+                    <a:schemeClr val="accent2"/>
+                  </a:solidFill>
+                </a:rPr>
+                <a:t>         (river outlets)</a:t>
+              </a:r>
+            </a:p>
+          </p:txBody>
+        </p:sp>
+        <p:sp>
+          <p:nvSpPr>
+            <p:cNvPr id="57" name="Trapezoid 56">
+              <a:extLst>
+                <a:ext uri="{FF2B5EF4-FFF2-40B4-BE49-F238E27FC236}">
+                  <a16:creationId xmlns:a16="http://schemas.microsoft.com/office/drawing/2014/main" id="{28711ABD-543B-4384-842A-93E86F5E561E}"/>
+                </a:ext>
+              </a:extLst>
+            </p:cNvPr>
+            <p:cNvSpPr/>
+            <p:nvPr/>
+          </p:nvSpPr>
+          <p:spPr>
+            <a:xfrm rot="10800000">
+              <a:off x="5385148" y="5428225"/>
+              <a:ext cx="1521097" cy="1233831"/>
+            </a:xfrm>
+            <a:prstGeom prst="trapezoid">
+              <a:avLst>
+                <a:gd name="adj" fmla="val 22857"/>
+              </a:avLst>
+            </a:prstGeom>
+            <a:solidFill>
+              <a:schemeClr val="accent5">
+                <a:lumMod val="40000"/>
+                <a:lumOff val="60000"/>
+              </a:schemeClr>
+            </a:solidFill>
+            <a:ln>
+              <a:solidFill>
+                <a:schemeClr val="tx1"/>
+              </a:solidFill>
+            </a:ln>
+          </p:spPr>
+          <p:style>
+            <a:lnRef idx="2">
+              <a:schemeClr val="accent1">
+                <a:shade val="50000"/>
+              </a:schemeClr>
+            </a:lnRef>
+            <a:fillRef idx="1">
+              <a:schemeClr val="accent1"/>
+            </a:fillRef>
+            <a:effectRef idx="0">
+              <a:schemeClr val="accent1"/>
+            </a:effectRef>
+            <a:fontRef idx="minor">
+              <a:schemeClr val="lt1"/>
+            </a:fontRef>
+          </p:style>
+          <p:txBody>
+            <a:bodyPr rtlCol="0" anchor="ctr"/>
+            <a:lstStyle/>
+            <a:p>
+              <a:pPr algn="ctr"/>
+              <a:endParaRPr lang="en-US" dirty="0"/>
+            </a:p>
+          </p:txBody>
+        </p:sp>
+        <p:cxnSp>
+          <p:nvCxnSpPr>
+            <p:cNvPr id="31" name="Straight Connector 30">
+              <a:extLst>
+                <a:ext uri="{FF2B5EF4-FFF2-40B4-BE49-F238E27FC236}">
+                  <a16:creationId xmlns:a16="http://schemas.microsoft.com/office/drawing/2014/main" id="{959D833C-985C-450B-AEE3-A99D076342C3}"/>
+                </a:ext>
+              </a:extLst>
+            </p:cNvPr>
+            <p:cNvCxnSpPr>
+              <a:cxnSpLocks/>
+            </p:cNvCxnSpPr>
+            <p:nvPr/>
+          </p:nvCxnSpPr>
+          <p:spPr>
+            <a:xfrm>
+              <a:off x="5411732" y="5815645"/>
+              <a:ext cx="1437070" cy="0"/>
+            </a:xfrm>
+            <a:prstGeom prst="line">
+              <a:avLst/>
+            </a:prstGeom>
+            <a:ln>
+              <a:solidFill>
+                <a:schemeClr val="tx1"/>
+              </a:solidFill>
+              <a:prstDash val="dash"/>
+            </a:ln>
+          </p:spPr>
+          <p:style>
+            <a:lnRef idx="1">
+              <a:schemeClr val="accent1"/>
+            </a:lnRef>
+            <a:fillRef idx="0">
+              <a:schemeClr val="accent1"/>
+            </a:fillRef>
+            <a:effectRef idx="0">
+              <a:schemeClr val="accent1"/>
+            </a:effectRef>
+            <a:fontRef idx="minor">
+              <a:schemeClr val="tx1"/>
+            </a:fontRef>
+          </p:style>
+        </p:cxnSp>
+        <p:cxnSp>
+          <p:nvCxnSpPr>
+            <p:cNvPr id="34" name="Straight Connector 33">
+              <a:extLst>
+                <a:ext uri="{FF2B5EF4-FFF2-40B4-BE49-F238E27FC236}">
+                  <a16:creationId xmlns:a16="http://schemas.microsoft.com/office/drawing/2014/main" id="{9C6E6E5C-5C75-481E-80A8-35FEDEB591A1}"/>
+                </a:ext>
+              </a:extLst>
+            </p:cNvPr>
+            <p:cNvCxnSpPr>
+              <a:cxnSpLocks/>
+            </p:cNvCxnSpPr>
+            <p:nvPr/>
+          </p:nvCxnSpPr>
+          <p:spPr>
+            <a:xfrm>
+              <a:off x="5447898" y="6099061"/>
+              <a:ext cx="1354102" cy="15464"/>
+            </a:xfrm>
+            <a:prstGeom prst="line">
+              <a:avLst/>
+            </a:prstGeom>
+            <a:ln>
+              <a:solidFill>
+                <a:schemeClr val="tx1"/>
+              </a:solidFill>
+              <a:prstDash val="dash"/>
+            </a:ln>
+          </p:spPr>
+          <p:style>
+            <a:lnRef idx="1">
+              <a:schemeClr val="accent1"/>
+            </a:lnRef>
+            <a:fillRef idx="0">
+              <a:schemeClr val="accent1"/>
+            </a:fillRef>
+            <a:effectRef idx="0">
+              <a:schemeClr val="accent1"/>
+            </a:effectRef>
+            <a:fontRef idx="minor">
+              <a:schemeClr val="tx1"/>
+            </a:fontRef>
+          </p:style>
+        </p:cxnSp>
+        <p:cxnSp>
+          <p:nvCxnSpPr>
+            <p:cNvPr id="39" name="Straight Connector 38">
+              <a:extLst>
+                <a:ext uri="{FF2B5EF4-FFF2-40B4-BE49-F238E27FC236}">
+                  <a16:creationId xmlns:a16="http://schemas.microsoft.com/office/drawing/2014/main" id="{B777BDD8-2483-4A06-9FB1-94D556098736}"/>
+                </a:ext>
+              </a:extLst>
+            </p:cNvPr>
+            <p:cNvCxnSpPr>
+              <a:cxnSpLocks/>
+            </p:cNvCxnSpPr>
+            <p:nvPr/>
+          </p:nvCxnSpPr>
+          <p:spPr>
+            <a:xfrm>
+              <a:off x="5592726" y="6569918"/>
+              <a:ext cx="1100469" cy="0"/>
+            </a:xfrm>
+            <a:prstGeom prst="line">
+              <a:avLst/>
+            </a:prstGeom>
+            <a:ln>
+              <a:solidFill>
+                <a:schemeClr val="tx1"/>
+              </a:solidFill>
+              <a:prstDash val="dash"/>
+            </a:ln>
+          </p:spPr>
+          <p:style>
+            <a:lnRef idx="1">
+              <a:schemeClr val="accent1"/>
+            </a:lnRef>
+            <a:fillRef idx="0">
+              <a:schemeClr val="accent1"/>
+            </a:fillRef>
+            <a:effectRef idx="0">
+              <a:schemeClr val="accent1"/>
+            </a:effectRef>
+            <a:fontRef idx="minor">
+              <a:schemeClr val="tx1"/>
+            </a:fontRef>
+          </p:style>
+        </p:cxnSp>
+        <p:sp>
+          <p:nvSpPr>
+            <p:cNvPr id="18" name="Rectangle 17">
+              <a:extLst>
+                <a:ext uri="{FF2B5EF4-FFF2-40B4-BE49-F238E27FC236}">
+                  <a16:creationId xmlns:a16="http://schemas.microsoft.com/office/drawing/2014/main" id="{0BE465A0-0C51-49A3-A194-55BF223B0D72}"/>
+                </a:ext>
+              </a:extLst>
+            </p:cNvPr>
+            <p:cNvSpPr/>
+            <p:nvPr/>
+          </p:nvSpPr>
+          <p:spPr>
+            <a:xfrm>
+              <a:off x="5261054" y="4318185"/>
+              <a:ext cx="1779654" cy="738664"/>
+            </a:xfrm>
+            <a:prstGeom prst="rect">
+              <a:avLst/>
+            </a:prstGeom>
+          </p:spPr>
+          <p:txBody>
+            <a:bodyPr wrap="none">
+              <a:spAutoFit/>
+            </a:bodyPr>
+            <a:lstStyle/>
+            <a:p>
+              <a:pPr algn="ctr"/>
+              <a:r>
+                <a:rPr lang="en-US" sz="2400" b="1" dirty="0"/>
+                <a:t>Lake Powell</a:t>
+              </a:r>
+            </a:p>
+            <a:p>
+              <a:pPr algn="ctr"/>
+              <a:r>
+                <a:rPr lang="en-US" dirty="0"/>
+                <a:t>(5.8 </a:t>
+              </a:r>
+              <a:r>
+                <a:rPr lang="en-US" dirty="0" err="1"/>
+                <a:t>maf</a:t>
+              </a:r>
+              <a:r>
+                <a:rPr lang="en-US" dirty="0"/>
+                <a:t> storage)</a:t>
+              </a:r>
+            </a:p>
+          </p:txBody>
+        </p:sp>
+      </p:grpSp>
+      <p:sp>
+        <p:nvSpPr>
+          <p:cNvPr id="99" name="Rectangle 98">
+            <a:extLst>
+              <a:ext uri="{FF2B5EF4-FFF2-40B4-BE49-F238E27FC236}">
+                <a16:creationId xmlns:a16="http://schemas.microsoft.com/office/drawing/2014/main" id="{939A850B-FCB5-4D24-A998-64B10A938A3B}"/>
+              </a:ext>
+            </a:extLst>
+          </p:cNvPr>
+          <p:cNvSpPr/>
+          <p:nvPr/>
+        </p:nvSpPr>
+        <p:spPr>
+          <a:xfrm>
+            <a:off x="4844035" y="4973306"/>
+            <a:ext cx="875176" cy="523220"/>
+          </a:xfrm>
+          <a:prstGeom prst="rect">
+            <a:avLst/>
+          </a:prstGeom>
+        </p:spPr>
+        <p:txBody>
+          <a:bodyPr wrap="none">
+            <a:spAutoFit/>
+          </a:bodyPr>
+          <a:lstStyle/>
+          <a:p>
+            <a:pPr algn="ctr"/>
+            <a:r>
+              <a:rPr lang="en-US" sz="1400" b="1" dirty="0"/>
+              <a:t>Elevation</a:t>
+            </a:r>
+          </a:p>
+          <a:p>
+            <a:pPr algn="ctr"/>
+            <a:r>
+              <a:rPr lang="en-US" sz="1400" b="1" dirty="0"/>
+              <a:t>(feet)</a:t>
+            </a:r>
+          </a:p>
+        </p:txBody>
+      </p:sp>
+      <p:sp>
+        <p:nvSpPr>
+          <p:cNvPr id="100" name="Rectangle 99">
+            <a:extLst>
+              <a:ext uri="{FF2B5EF4-FFF2-40B4-BE49-F238E27FC236}">
+                <a16:creationId xmlns:a16="http://schemas.microsoft.com/office/drawing/2014/main" id="{34181254-46CA-43AD-9475-F6942AEBB93B}"/>
+              </a:ext>
+            </a:extLst>
+          </p:cNvPr>
+          <p:cNvSpPr/>
+          <p:nvPr/>
+        </p:nvSpPr>
+        <p:spPr>
+          <a:xfrm>
+            <a:off x="6341186" y="4969941"/>
+            <a:ext cx="755015" cy="523220"/>
+          </a:xfrm>
+          <a:prstGeom prst="rect">
+            <a:avLst/>
+          </a:prstGeom>
+        </p:spPr>
+        <p:txBody>
+          <a:bodyPr wrap="none">
+            <a:spAutoFit/>
+          </a:bodyPr>
+          <a:lstStyle/>
+          <a:p>
+            <a:pPr algn="ctr"/>
+            <a:r>
+              <a:rPr lang="en-US" sz="1400" b="1" dirty="0">
+                <a:solidFill>
+                  <a:schemeClr val="accent2"/>
+                </a:solidFill>
+              </a:rPr>
+              <a:t>Volume</a:t>
+            </a:r>
+          </a:p>
+          <a:p>
+            <a:pPr algn="ctr"/>
+            <a:r>
+              <a:rPr lang="en-US" sz="1400" b="1" dirty="0">
+                <a:solidFill>
+                  <a:schemeClr val="accent2"/>
+                </a:solidFill>
+              </a:rPr>
+              <a:t>(</a:t>
+            </a:r>
+            <a:r>
+              <a:rPr lang="en-US" sz="1400" b="1" dirty="0" err="1">
+                <a:solidFill>
+                  <a:schemeClr val="accent2"/>
+                </a:solidFill>
+              </a:rPr>
+              <a:t>maf</a:t>
+            </a:r>
+            <a:r>
+              <a:rPr lang="en-US" sz="1400" b="1" dirty="0">
+                <a:solidFill>
+                  <a:schemeClr val="accent2"/>
+                </a:solidFill>
+              </a:rPr>
+              <a:t>)</a:t>
+            </a:r>
+          </a:p>
+        </p:txBody>
+      </p:sp>
+      <p:sp>
+        <p:nvSpPr>
+          <p:cNvPr id="104" name="Rectangle 103">
+            <a:extLst>
+              <a:ext uri="{FF2B5EF4-FFF2-40B4-BE49-F238E27FC236}">
+                <a16:creationId xmlns:a16="http://schemas.microsoft.com/office/drawing/2014/main" id="{EE5F55EF-A24E-4CB4-A870-63A8D7C500AC}"/>
+              </a:ext>
+            </a:extLst>
+          </p:cNvPr>
+          <p:cNvSpPr/>
+          <p:nvPr/>
+        </p:nvSpPr>
+        <p:spPr>
+          <a:xfrm>
+            <a:off x="5569542" y="3572854"/>
+            <a:ext cx="893450" cy="369332"/>
+          </a:xfrm>
+          <a:prstGeom prst="rect">
+            <a:avLst/>
+          </a:prstGeom>
+        </p:spPr>
+        <p:txBody>
+          <a:bodyPr wrap="none">
+            <a:spAutoFit/>
+          </a:bodyPr>
+          <a:lstStyle/>
+          <a:p>
+            <a:pPr algn="ctr"/>
+            <a:r>
+              <a:rPr lang="en-US" dirty="0">
+                <a:solidFill>
+                  <a:srgbClr val="0000FF"/>
+                </a:solidFill>
+              </a:rPr>
+              <a:t>1.8 </a:t>
+            </a:r>
+            <a:r>
+              <a:rPr lang="en-US" dirty="0" err="1">
+                <a:solidFill>
+                  <a:srgbClr val="0000FF"/>
+                </a:solidFill>
+              </a:rPr>
+              <a:t>maf</a:t>
+            </a:r>
+            <a:endParaRPr lang="en-US" dirty="0">
+              <a:solidFill>
+                <a:srgbClr val="0000FF"/>
+              </a:solidFill>
+            </a:endParaRPr>
+          </a:p>
+        </p:txBody>
+      </p:sp>
+      <p:sp>
+        <p:nvSpPr>
+          <p:cNvPr id="105" name="Rectangle 104">
+            <a:extLst>
+              <a:ext uri="{FF2B5EF4-FFF2-40B4-BE49-F238E27FC236}">
+                <a16:creationId xmlns:a16="http://schemas.microsoft.com/office/drawing/2014/main" id="{CF457671-AB44-43F0-80E4-AB64C40A03E0}"/>
+              </a:ext>
+            </a:extLst>
+          </p:cNvPr>
+          <p:cNvSpPr/>
+          <p:nvPr/>
+        </p:nvSpPr>
+        <p:spPr>
+          <a:xfrm>
+            <a:off x="5577270" y="3917565"/>
+            <a:ext cx="893450" cy="369332"/>
+          </a:xfrm>
+          <a:prstGeom prst="rect">
+            <a:avLst/>
+          </a:prstGeom>
+        </p:spPr>
+        <p:txBody>
+          <a:bodyPr wrap="none">
+            <a:spAutoFit/>
+          </a:bodyPr>
+          <a:lstStyle/>
+          <a:p>
+            <a:pPr algn="ctr"/>
+            <a:r>
+              <a:rPr lang="en-US" dirty="0">
+                <a:solidFill>
+                  <a:srgbClr val="0000FF"/>
+                </a:solidFill>
+              </a:rPr>
+              <a:t>1.5 </a:t>
+            </a:r>
+            <a:r>
+              <a:rPr lang="en-US" dirty="0" err="1">
+                <a:solidFill>
+                  <a:srgbClr val="0000FF"/>
+                </a:solidFill>
+              </a:rPr>
+              <a:t>maf</a:t>
+            </a:r>
+            <a:endParaRPr lang="en-US" dirty="0">
+              <a:solidFill>
+                <a:srgbClr val="0000FF"/>
+              </a:solidFill>
+            </a:endParaRPr>
+          </a:p>
+        </p:txBody>
+      </p:sp>
+      <p:sp>
+        <p:nvSpPr>
+          <p:cNvPr id="47" name="TextBox 46">
+            <a:extLst>
+              <a:ext uri="{FF2B5EF4-FFF2-40B4-BE49-F238E27FC236}">
+                <a16:creationId xmlns:a16="http://schemas.microsoft.com/office/drawing/2014/main" id="{BD69ABEF-093D-4D29-8F5E-245FC131024D}"/>
+              </a:ext>
+            </a:extLst>
+          </p:cNvPr>
+          <p:cNvSpPr txBox="1"/>
+          <p:nvPr/>
+        </p:nvSpPr>
+        <p:spPr>
+          <a:xfrm>
+            <a:off x="7219424" y="5294916"/>
+            <a:ext cx="3487062" cy="1015663"/>
+          </a:xfrm>
+          <a:prstGeom prst="rect">
+            <a:avLst/>
+          </a:prstGeom>
+          <a:solidFill>
+            <a:schemeClr val="accent5">
+              <a:lumMod val="20000"/>
+              <a:lumOff val="80000"/>
+            </a:schemeClr>
+          </a:solidFill>
+          <a:ln>
+            <a:solidFill>
+              <a:schemeClr val="tx1"/>
+            </a:solidFill>
+          </a:ln>
+        </p:spPr>
+        <p:txBody>
+          <a:bodyPr wrap="square" rtlCol="0">
+            <a:spAutoFit/>
+          </a:bodyPr>
+          <a:lstStyle/>
+          <a:p>
+            <a:pPr algn="ctr"/>
+            <a:r>
+              <a:rPr lang="en-US" sz="2000" b="1" dirty="0"/>
+              <a:t>Drawdown</a:t>
+            </a:r>
+          </a:p>
+          <a:p>
+            <a:pPr algn="ctr"/>
+            <a:r>
+              <a:rPr lang="en-US" sz="2000" dirty="0"/>
+              <a:t>-2.1 </a:t>
+            </a:r>
+            <a:r>
+              <a:rPr lang="en-US" sz="2000" dirty="0" err="1"/>
+              <a:t>maf</a:t>
+            </a:r>
+            <a:r>
+              <a:rPr lang="en-US" sz="2000" dirty="0"/>
+              <a:t> Oct. 2019 to Sep. 2020</a:t>
+            </a:r>
+          </a:p>
+          <a:p>
+            <a:pPr algn="ctr"/>
+            <a:r>
+              <a:rPr lang="en-US" sz="2000" dirty="0"/>
+              <a:t>-3.8 </a:t>
+            </a:r>
+            <a:r>
+              <a:rPr lang="en-US" sz="2000" dirty="0" err="1"/>
+              <a:t>maf</a:t>
+            </a:r>
+            <a:r>
+              <a:rPr lang="en-US" sz="2000" dirty="0"/>
+              <a:t> Oct. 2020 to Sep. 2021</a:t>
+            </a:r>
+          </a:p>
+        </p:txBody>
+      </p:sp>
+    </p:spTree>
+    <p:extLst>
+      <p:ext uri="{BB962C8B-B14F-4D97-AF65-F5344CB8AC3E}">
+        <p14:creationId xmlns:p14="http://schemas.microsoft.com/office/powerpoint/2010/main" val="1679956396"/>
+      </p:ext>
+    </p:extLst>
+  </p:cSld>
+  <p:clrMapOvr>
+    <a:masterClrMapping/>
+  </p:clrMapOvr>
+</p:sld>
+</file>
+
 <file path=ppt/theme/theme1.xml><?xml version="1.0" encoding="utf-8"?>
 <a:theme xmlns:a="http://schemas.openxmlformats.org/drawingml/2006/main" name="Office Theme">
   <a:themeElements>

</xml_diff>

<commit_message>
Add current year drawdown to figure
</commit_message>
<xml_diff>
--- a/ProtectPowellInBrief/ProtectLakePowellInBrief-DataAssembly.pptx
+++ b/ProtectPowellInBrief/ProtectLakePowellInBrief-DataAssembly.pptx
@@ -260,7 +260,7 @@
           <a:p>
             <a:fld id="{DADD071D-6307-46EF-8484-8AD6D8EF0DAB}" type="datetimeFigureOut">
               <a:rPr lang="en-US" smtClean="0"/>
-              <a:t>4/8/2022</a:t>
+              <a:t>4/14/2022</a:t>
             </a:fld>
             <a:endParaRPr lang="en-US"/>
           </a:p>
@@ -458,7 +458,7 @@
           <a:p>
             <a:fld id="{DADD071D-6307-46EF-8484-8AD6D8EF0DAB}" type="datetimeFigureOut">
               <a:rPr lang="en-US" smtClean="0"/>
-              <a:t>4/8/2022</a:t>
+              <a:t>4/14/2022</a:t>
             </a:fld>
             <a:endParaRPr lang="en-US"/>
           </a:p>
@@ -666,7 +666,7 @@
           <a:p>
             <a:fld id="{DADD071D-6307-46EF-8484-8AD6D8EF0DAB}" type="datetimeFigureOut">
               <a:rPr lang="en-US" smtClean="0"/>
-              <a:t>4/8/2022</a:t>
+              <a:t>4/14/2022</a:t>
             </a:fld>
             <a:endParaRPr lang="en-US"/>
           </a:p>
@@ -864,7 +864,7 @@
           <a:p>
             <a:fld id="{DADD071D-6307-46EF-8484-8AD6D8EF0DAB}" type="datetimeFigureOut">
               <a:rPr lang="en-US" smtClean="0"/>
-              <a:t>4/8/2022</a:t>
+              <a:t>4/14/2022</a:t>
             </a:fld>
             <a:endParaRPr lang="en-US"/>
           </a:p>
@@ -1139,7 +1139,7 @@
           <a:p>
             <a:fld id="{DADD071D-6307-46EF-8484-8AD6D8EF0DAB}" type="datetimeFigureOut">
               <a:rPr lang="en-US" smtClean="0"/>
-              <a:t>4/8/2022</a:t>
+              <a:t>4/14/2022</a:t>
             </a:fld>
             <a:endParaRPr lang="en-US"/>
           </a:p>
@@ -1404,7 +1404,7 @@
           <a:p>
             <a:fld id="{DADD071D-6307-46EF-8484-8AD6D8EF0DAB}" type="datetimeFigureOut">
               <a:rPr lang="en-US" smtClean="0"/>
-              <a:t>4/8/2022</a:t>
+              <a:t>4/14/2022</a:t>
             </a:fld>
             <a:endParaRPr lang="en-US"/>
           </a:p>
@@ -1816,7 +1816,7 @@
           <a:p>
             <a:fld id="{DADD071D-6307-46EF-8484-8AD6D8EF0DAB}" type="datetimeFigureOut">
               <a:rPr lang="en-US" smtClean="0"/>
-              <a:t>4/8/2022</a:t>
+              <a:t>4/14/2022</a:t>
             </a:fld>
             <a:endParaRPr lang="en-US"/>
           </a:p>
@@ -1957,7 +1957,7 @@
           <a:p>
             <a:fld id="{DADD071D-6307-46EF-8484-8AD6D8EF0DAB}" type="datetimeFigureOut">
               <a:rPr lang="en-US" smtClean="0"/>
-              <a:t>4/8/2022</a:t>
+              <a:t>4/14/2022</a:t>
             </a:fld>
             <a:endParaRPr lang="en-US"/>
           </a:p>
@@ -2070,7 +2070,7 @@
           <a:p>
             <a:fld id="{DADD071D-6307-46EF-8484-8AD6D8EF0DAB}" type="datetimeFigureOut">
               <a:rPr lang="en-US" smtClean="0"/>
-              <a:t>4/8/2022</a:t>
+              <a:t>4/14/2022</a:t>
             </a:fld>
             <a:endParaRPr lang="en-US"/>
           </a:p>
@@ -2381,7 +2381,7 @@
           <a:p>
             <a:fld id="{DADD071D-6307-46EF-8484-8AD6D8EF0DAB}" type="datetimeFigureOut">
               <a:rPr lang="en-US" smtClean="0"/>
-              <a:t>4/8/2022</a:t>
+              <a:t>4/14/2022</a:t>
             </a:fld>
             <a:endParaRPr lang="en-US"/>
           </a:p>
@@ -2669,7 +2669,7 @@
           <a:p>
             <a:fld id="{DADD071D-6307-46EF-8484-8AD6D8EF0DAB}" type="datetimeFigureOut">
               <a:rPr lang="en-US" smtClean="0"/>
-              <a:t>4/8/2022</a:t>
+              <a:t>4/14/2022</a:t>
             </a:fld>
             <a:endParaRPr lang="en-US"/>
           </a:p>
@@ -2910,7 +2910,7 @@
           <a:p>
             <a:fld id="{DADD071D-6307-46EF-8484-8AD6D8EF0DAB}" type="datetimeFigureOut">
               <a:rPr lang="en-US" smtClean="0"/>
-              <a:t>4/8/2022</a:t>
+              <a:t>4/14/2022</a:t>
             </a:fld>
             <a:endParaRPr lang="en-US"/>
           </a:p>
@@ -3341,7 +3341,7 @@
         </p:nvSpPr>
         <p:spPr>
           <a:xfrm>
-            <a:off x="9555114" y="4601575"/>
+            <a:off x="9555114" y="4418695"/>
             <a:ext cx="2302746" cy="1015663"/>
           </a:xfrm>
           <a:prstGeom prst="rect">
@@ -3419,7 +3419,7 @@
         </p:nvSpPr>
         <p:spPr>
           <a:xfrm>
-            <a:off x="9379130" y="3400053"/>
+            <a:off x="9379130" y="3217173"/>
             <a:ext cx="2812870" cy="1015663"/>
           </a:xfrm>
           <a:prstGeom prst="rect">
@@ -3497,7 +3497,7 @@
         </p:nvSpPr>
         <p:spPr>
           <a:xfrm>
-            <a:off x="8095492" y="1308326"/>
+            <a:off x="8095492" y="1125446"/>
             <a:ext cx="3764828" cy="1323439"/>
           </a:xfrm>
           <a:prstGeom prst="rect">
@@ -3602,7 +3602,7 @@
         </p:nvSpPr>
         <p:spPr>
           <a:xfrm>
-            <a:off x="4684783" y="1500498"/>
+            <a:off x="4684783" y="1317618"/>
             <a:ext cx="2618217" cy="707886"/>
           </a:xfrm>
           <a:prstGeom prst="rect">
@@ -3653,7 +3653,7 @@
         </p:nvSpPr>
         <p:spPr>
           <a:xfrm>
-            <a:off x="973875" y="2682201"/>
+            <a:off x="973875" y="2499321"/>
             <a:ext cx="2397002" cy="1015663"/>
           </a:xfrm>
           <a:prstGeom prst="rect">
@@ -3731,7 +3731,7 @@
         </p:nvSpPr>
         <p:spPr>
           <a:xfrm>
-            <a:off x="112800" y="4044133"/>
+            <a:off x="112800" y="3861253"/>
             <a:ext cx="4119153" cy="1323439"/>
           </a:xfrm>
           <a:prstGeom prst="rect">
@@ -3830,7 +3830,7 @@
         </p:nvCxnSpPr>
         <p:spPr>
           <a:xfrm flipH="1" flipV="1">
-            <a:off x="8438606" y="4450768"/>
+            <a:off x="8438606" y="4267888"/>
             <a:ext cx="1116508" cy="658639"/>
           </a:xfrm>
           <a:prstGeom prst="straightConnector1">
@@ -3873,7 +3873,7 @@
         </p:nvCxnSpPr>
         <p:spPr>
           <a:xfrm flipH="1">
-            <a:off x="8438606" y="3907885"/>
+            <a:off x="8438606" y="3725005"/>
             <a:ext cx="940524" cy="542883"/>
           </a:xfrm>
           <a:prstGeom prst="straightConnector1">
@@ -3916,7 +3916,7 @@
         </p:nvCxnSpPr>
         <p:spPr>
           <a:xfrm flipH="1">
-            <a:off x="8438606" y="2631765"/>
+            <a:off x="8438606" y="2448885"/>
             <a:ext cx="1539300" cy="1819003"/>
           </a:xfrm>
           <a:prstGeom prst="straightConnector1">
@@ -3959,7 +3959,7 @@
         </p:nvCxnSpPr>
         <p:spPr>
           <a:xfrm flipH="1" flipV="1">
-            <a:off x="5993892" y="2208384"/>
+            <a:off x="5993892" y="2025504"/>
             <a:ext cx="26880" cy="750816"/>
           </a:xfrm>
           <a:prstGeom prst="straightConnector1">
@@ -4002,7 +4002,7 @@
         </p:nvCxnSpPr>
         <p:spPr>
           <a:xfrm flipH="1" flipV="1">
-            <a:off x="3370877" y="3190033"/>
+            <a:off x="3370877" y="3007153"/>
             <a:ext cx="1253213" cy="850296"/>
           </a:xfrm>
           <a:prstGeom prst="straightConnector1">
@@ -4045,7 +4045,7 @@
         </p:nvCxnSpPr>
         <p:spPr>
           <a:xfrm flipH="1">
-            <a:off x="4231953" y="4040329"/>
+            <a:off x="4231953" y="3857449"/>
             <a:ext cx="392137" cy="665524"/>
           </a:xfrm>
           <a:prstGeom prst="straightConnector1">
@@ -4084,7 +4084,7 @@
         </p:nvSpPr>
         <p:spPr>
           <a:xfrm>
-            <a:off x="688637" y="5727937"/>
+            <a:off x="688637" y="5545057"/>
             <a:ext cx="2682240" cy="830997"/>
           </a:xfrm>
           <a:prstGeom prst="rect">
@@ -4134,7 +4134,7 @@
         </p:nvSpPr>
         <p:spPr>
           <a:xfrm>
-            <a:off x="365761" y="400929"/>
+            <a:off x="365761" y="218049"/>
             <a:ext cx="11256262" cy="584775"/>
           </a:xfrm>
           <a:prstGeom prst="rect">
@@ -4176,7 +4176,7 @@
         </p:nvGrpSpPr>
         <p:grpSpPr>
           <a:xfrm>
-            <a:off x="4624090" y="2916266"/>
+            <a:off x="4624090" y="2733386"/>
             <a:ext cx="4119153" cy="2657782"/>
             <a:chOff x="4754199" y="4275251"/>
             <a:chExt cx="4119153" cy="2657782"/>
@@ -4866,7 +4866,7 @@
         </p:nvSpPr>
         <p:spPr>
           <a:xfrm>
-            <a:off x="4844035" y="5469692"/>
+            <a:off x="4844035" y="5286812"/>
             <a:ext cx="875176" cy="523220"/>
           </a:xfrm>
           <a:prstGeom prst="rect">
@@ -4908,7 +4908,7 @@
         </p:nvSpPr>
         <p:spPr>
           <a:xfrm>
-            <a:off x="6341186" y="5466327"/>
+            <a:off x="6341186" y="5283447"/>
             <a:ext cx="755015" cy="523220"/>
           </a:xfrm>
           <a:prstGeom prst="rect">
@@ -4974,7 +4974,7 @@
         </p:nvSpPr>
         <p:spPr>
           <a:xfrm>
-            <a:off x="5569542" y="4069240"/>
+            <a:off x="5569542" y="3886360"/>
             <a:ext cx="893450" cy="369332"/>
           </a:xfrm>
           <a:prstGeom prst="rect">
@@ -5026,7 +5026,7 @@
         </p:nvSpPr>
         <p:spPr>
           <a:xfrm>
-            <a:off x="5577270" y="4413951"/>
+            <a:off x="5577270" y="4231071"/>
             <a:ext cx="893450" cy="369332"/>
           </a:xfrm>
           <a:prstGeom prst="rect">
@@ -5078,8 +5078,8 @@
         </p:nvSpPr>
         <p:spPr>
           <a:xfrm>
-            <a:off x="7219424" y="5791302"/>
-            <a:ext cx="3487062" cy="1015663"/>
+            <a:off x="7220304" y="5469410"/>
+            <a:ext cx="3172641" cy="1231106"/>
           </a:xfrm>
           <a:prstGeom prst="rect">
             <a:avLst/>
@@ -5111,32 +5111,216 @@
           <a:p>
             <a:pPr algn="ctr"/>
             <a:r>
-              <a:rPr lang="en-US" sz="2000" dirty="0"/>
+              <a:rPr lang="en-US" dirty="0"/>
               <a:t>-2.1 </a:t>
             </a:r>
             <a:r>
-              <a:rPr lang="en-US" sz="2000" dirty="0" err="1"/>
+              <a:rPr lang="en-US" dirty="0" err="1"/>
               <a:t>maf</a:t>
             </a:r>
             <a:r>
-              <a:rPr lang="en-US" sz="2000" dirty="0"/>
+              <a:rPr lang="en-US" dirty="0"/>
               <a:t> Oct. 2019 to Sep. 2020</a:t>
             </a:r>
           </a:p>
           <a:p>
             <a:pPr algn="ctr"/>
             <a:r>
-              <a:rPr lang="en-US" sz="2000" dirty="0"/>
+              <a:rPr lang="en-US" dirty="0"/>
               <a:t>-3.8 </a:t>
             </a:r>
             <a:r>
-              <a:rPr lang="en-US" sz="2000" dirty="0" err="1"/>
+              <a:rPr lang="en-US" dirty="0" err="1"/>
               <a:t>maf</a:t>
             </a:r>
             <a:r>
-              <a:rPr lang="en-US" sz="2000" dirty="0"/>
+              <a:rPr lang="en-US" dirty="0"/>
               <a:t> Oct. 2020 to Sep. 2021</a:t>
             </a:r>
+          </a:p>
+          <a:p>
+            <a:pPr algn="ctr"/>
+            <a:r>
+              <a:rPr lang="en-US" dirty="0"/>
+              <a:t>-1.4 </a:t>
+            </a:r>
+            <a:r>
+              <a:rPr lang="en-US" dirty="0" err="1"/>
+              <a:t>maf</a:t>
+            </a:r>
+            <a:r>
+              <a:rPr lang="en-US" dirty="0"/>
+              <a:t> Oct. 2021 to Mar. 2022</a:t>
+            </a:r>
+          </a:p>
+        </p:txBody>
+      </p:sp>
+      <p:cxnSp>
+        <p:nvCxnSpPr>
+          <p:cNvPr id="42" name="Straight Connector 41">
+            <a:extLst>
+              <a:ext uri="{FF2B5EF4-FFF2-40B4-BE49-F238E27FC236}">
+                <a16:creationId xmlns:a16="http://schemas.microsoft.com/office/drawing/2014/main" id="{7C72FDD8-6E25-44CF-B2E5-C2F735880757}"/>
+              </a:ext>
+            </a:extLst>
+          </p:cNvPr>
+          <p:cNvCxnSpPr>
+            <a:cxnSpLocks/>
+          </p:cNvCxnSpPr>
+          <p:nvPr/>
+        </p:nvCxnSpPr>
+        <p:spPr>
+          <a:xfrm>
+            <a:off x="5130945" y="3633404"/>
+            <a:ext cx="1779654" cy="0"/>
+          </a:xfrm>
+          <a:prstGeom prst="line">
+            <a:avLst/>
+          </a:prstGeom>
+          <a:ln>
+            <a:solidFill>
+              <a:schemeClr val="tx1"/>
+            </a:solidFill>
+            <a:prstDash val="dash"/>
+          </a:ln>
+        </p:spPr>
+        <p:style>
+          <a:lnRef idx="1">
+            <a:schemeClr val="accent1"/>
+          </a:lnRef>
+          <a:fillRef idx="0">
+            <a:schemeClr val="accent1"/>
+          </a:fillRef>
+          <a:effectRef idx="0">
+            <a:schemeClr val="accent1"/>
+          </a:effectRef>
+          <a:fontRef idx="minor">
+            <a:schemeClr val="tx1"/>
+          </a:fontRef>
+        </p:style>
+      </p:cxnSp>
+      <p:sp>
+        <p:nvSpPr>
+          <p:cNvPr id="43" name="Rectangle 42">
+            <a:extLst>
+              <a:ext uri="{FF2B5EF4-FFF2-40B4-BE49-F238E27FC236}">
+                <a16:creationId xmlns:a16="http://schemas.microsoft.com/office/drawing/2014/main" id="{F0A4CBBC-7FA3-4D7D-9B9E-85A55C4B350D}"/>
+              </a:ext>
+            </a:extLst>
+          </p:cNvPr>
+          <p:cNvSpPr/>
+          <p:nvPr/>
+        </p:nvSpPr>
+        <p:spPr>
+          <a:xfrm>
+            <a:off x="6861234" y="3473874"/>
+            <a:ext cx="1957191" cy="307777"/>
+          </a:xfrm>
+          <a:prstGeom prst="rect">
+            <a:avLst/>
+          </a:prstGeom>
+        </p:spPr>
+        <p:txBody>
+          <a:bodyPr wrap="square">
+            <a:spAutoFit/>
+          </a:bodyPr>
+          <a:lstStyle/>
+          <a:p>
+            <a:r>
+              <a:rPr lang="en-US" sz="1400" dirty="0">
+                <a:solidFill>
+                  <a:schemeClr val="accent2"/>
+                </a:solidFill>
+              </a:rPr>
+              <a:t>7.2 – Oct. 1, 2021 level</a:t>
+            </a:r>
+          </a:p>
+        </p:txBody>
+      </p:sp>
+      <p:sp>
+        <p:nvSpPr>
+          <p:cNvPr id="44" name="Rectangle 43">
+            <a:extLst>
+              <a:ext uri="{FF2B5EF4-FFF2-40B4-BE49-F238E27FC236}">
+                <a16:creationId xmlns:a16="http://schemas.microsoft.com/office/drawing/2014/main" id="{357E66BA-FD9C-4FCA-948F-910B489DF49C}"/>
+              </a:ext>
+            </a:extLst>
+          </p:cNvPr>
+          <p:cNvSpPr/>
+          <p:nvPr/>
+        </p:nvSpPr>
+        <p:spPr>
+          <a:xfrm>
+            <a:off x="4546516" y="3482640"/>
+            <a:ext cx="595036" cy="307777"/>
+          </a:xfrm>
+          <a:prstGeom prst="rect">
+            <a:avLst/>
+          </a:prstGeom>
+        </p:spPr>
+        <p:txBody>
+          <a:bodyPr wrap="none">
+            <a:spAutoFit/>
+          </a:bodyPr>
+          <a:lstStyle/>
+          <a:p>
+            <a:pPr algn="ctr"/>
+            <a:r>
+              <a:rPr lang="en-US" sz="1400" dirty="0"/>
+              <a:t>3,544</a:t>
+            </a:r>
+          </a:p>
+        </p:txBody>
+      </p:sp>
+      <p:sp>
+        <p:nvSpPr>
+          <p:cNvPr id="45" name="Rectangle 44">
+            <a:extLst>
+              <a:ext uri="{FF2B5EF4-FFF2-40B4-BE49-F238E27FC236}">
+                <a16:creationId xmlns:a16="http://schemas.microsoft.com/office/drawing/2014/main" id="{B6ADE48F-4948-4D71-AB11-808369DC8825}"/>
+              </a:ext>
+            </a:extLst>
+          </p:cNvPr>
+          <p:cNvSpPr/>
+          <p:nvPr/>
+        </p:nvSpPr>
+        <p:spPr>
+          <a:xfrm>
+            <a:off x="5569384" y="4597207"/>
+            <a:ext cx="893450" cy="369332"/>
+          </a:xfrm>
+          <a:prstGeom prst="rect">
+            <a:avLst/>
+          </a:prstGeom>
+        </p:spPr>
+        <p:txBody>
+          <a:bodyPr wrap="none">
+            <a:spAutoFit/>
+          </a:bodyPr>
+          <a:lstStyle/>
+          <a:p>
+            <a:pPr algn="ctr"/>
+            <a:r>
+              <a:rPr lang="en-US" dirty="0">
+                <a:solidFill>
+                  <a:srgbClr val="0000FF"/>
+                </a:solidFill>
+              </a:rPr>
+              <a:t>2.5 </a:t>
+            </a:r>
+            <a:r>
+              <a:rPr lang="en-US" dirty="0" err="1">
+                <a:solidFill>
+                  <a:srgbClr val="0000FF"/>
+                </a:solidFill>
+              </a:rPr>
+              <a:t>maf</a:t>
+            </a:r>
+            <a:endParaRPr lang="en-US" dirty="0">
+              <a:solidFill>
+                <a:srgbClr val="0000FF"/>
+              </a:solidFill>
+            </a:endParaRPr>
           </a:p>
         </p:txBody>
       </p:sp>
@@ -5184,7 +5368,7 @@
         </p:nvSpPr>
         <p:spPr>
           <a:xfrm>
-            <a:off x="9555114" y="4105189"/>
+            <a:off x="9555114" y="4000681"/>
             <a:ext cx="2302746" cy="1015663"/>
           </a:xfrm>
           <a:prstGeom prst="rect">
@@ -5262,7 +5446,7 @@
         </p:nvSpPr>
         <p:spPr>
           <a:xfrm>
-            <a:off x="9379130" y="2903667"/>
+            <a:off x="9379130" y="2799159"/>
             <a:ext cx="2812870" cy="1015663"/>
           </a:xfrm>
           <a:prstGeom prst="rect">
@@ -5340,7 +5524,7 @@
         </p:nvSpPr>
         <p:spPr>
           <a:xfrm>
-            <a:off x="8095492" y="811940"/>
+            <a:off x="8095492" y="707432"/>
             <a:ext cx="3764828" cy="1323439"/>
           </a:xfrm>
           <a:prstGeom prst="rect">
@@ -5445,7 +5629,7 @@
         </p:nvSpPr>
         <p:spPr>
           <a:xfrm>
-            <a:off x="4684783" y="1004112"/>
+            <a:off x="4684783" y="899604"/>
             <a:ext cx="2618217" cy="707886"/>
           </a:xfrm>
           <a:prstGeom prst="rect">
@@ -5496,7 +5680,7 @@
         </p:nvSpPr>
         <p:spPr>
           <a:xfrm>
-            <a:off x="973875" y="2185815"/>
+            <a:off x="973875" y="2081307"/>
             <a:ext cx="2397002" cy="1015663"/>
           </a:xfrm>
           <a:prstGeom prst="rect">
@@ -5574,7 +5758,7 @@
         </p:nvSpPr>
         <p:spPr>
           <a:xfrm>
-            <a:off x="112800" y="3547747"/>
+            <a:off x="112800" y="3443239"/>
             <a:ext cx="4119153" cy="1323439"/>
           </a:xfrm>
           <a:prstGeom prst="rect">
@@ -5673,7 +5857,7 @@
         </p:nvCxnSpPr>
         <p:spPr>
           <a:xfrm flipH="1" flipV="1">
-            <a:off x="8438606" y="3954382"/>
+            <a:off x="8438606" y="3849874"/>
             <a:ext cx="1116508" cy="658639"/>
           </a:xfrm>
           <a:prstGeom prst="straightConnector1">
@@ -5716,7 +5900,7 @@
         </p:nvCxnSpPr>
         <p:spPr>
           <a:xfrm flipH="1">
-            <a:off x="8438606" y="3411499"/>
+            <a:off x="8438606" y="3306991"/>
             <a:ext cx="940524" cy="542883"/>
           </a:xfrm>
           <a:prstGeom prst="straightConnector1">
@@ -5759,7 +5943,7 @@
         </p:nvCxnSpPr>
         <p:spPr>
           <a:xfrm flipH="1">
-            <a:off x="8438606" y="2135379"/>
+            <a:off x="8438606" y="2030871"/>
             <a:ext cx="1539300" cy="1819003"/>
           </a:xfrm>
           <a:prstGeom prst="straightConnector1">
@@ -5802,7 +5986,7 @@
         </p:nvCxnSpPr>
         <p:spPr>
           <a:xfrm flipH="1" flipV="1">
-            <a:off x="5993892" y="1711998"/>
+            <a:off x="5993892" y="1607490"/>
             <a:ext cx="26880" cy="750816"/>
           </a:xfrm>
           <a:prstGeom prst="straightConnector1">
@@ -5845,7 +6029,7 @@
         </p:nvCxnSpPr>
         <p:spPr>
           <a:xfrm flipH="1" flipV="1">
-            <a:off x="3370877" y="2693647"/>
+            <a:off x="3370877" y="2589139"/>
             <a:ext cx="1253213" cy="850296"/>
           </a:xfrm>
           <a:prstGeom prst="straightConnector1">
@@ -5888,7 +6072,7 @@
         </p:nvCxnSpPr>
         <p:spPr>
           <a:xfrm flipH="1">
-            <a:off x="4231953" y="3543943"/>
+            <a:off x="4231953" y="3439435"/>
             <a:ext cx="392137" cy="665524"/>
           </a:xfrm>
           <a:prstGeom prst="straightConnector1">
@@ -5927,7 +6111,7 @@
         </p:nvSpPr>
         <p:spPr>
           <a:xfrm>
-            <a:off x="688637" y="5231551"/>
+            <a:off x="688637" y="5127043"/>
             <a:ext cx="2682240" cy="830997"/>
           </a:xfrm>
           <a:prstGeom prst="rect">
@@ -5977,7 +6161,7 @@
         </p:nvGrpSpPr>
         <p:grpSpPr>
           <a:xfrm>
-            <a:off x="4624090" y="2419880"/>
+            <a:off x="4624090" y="2315372"/>
             <a:ext cx="4119153" cy="2657782"/>
             <a:chOff x="4754199" y="4275251"/>
             <a:chExt cx="4119153" cy="2657782"/>
@@ -6667,7 +6851,7 @@
         </p:nvSpPr>
         <p:spPr>
           <a:xfrm>
-            <a:off x="4844035" y="4973306"/>
+            <a:off x="4844035" y="4868798"/>
             <a:ext cx="875176" cy="523220"/>
           </a:xfrm>
           <a:prstGeom prst="rect">
@@ -6709,7 +6893,7 @@
         </p:nvSpPr>
         <p:spPr>
           <a:xfrm>
-            <a:off x="6341186" y="4969941"/>
+            <a:off x="6341186" y="4865433"/>
             <a:ext cx="755015" cy="523220"/>
           </a:xfrm>
           <a:prstGeom prst="rect">
@@ -6775,7 +6959,7 @@
         </p:nvSpPr>
         <p:spPr>
           <a:xfrm>
-            <a:off x="5569542" y="3572854"/>
+            <a:off x="5569542" y="3468346"/>
             <a:ext cx="893450" cy="369332"/>
           </a:xfrm>
           <a:prstGeom prst="rect">
@@ -6827,7 +7011,7 @@
         </p:nvSpPr>
         <p:spPr>
           <a:xfrm>
-            <a:off x="5577270" y="3917565"/>
+            <a:off x="5577270" y="3813057"/>
             <a:ext cx="893450" cy="369332"/>
           </a:xfrm>
           <a:prstGeom prst="rect">
@@ -6879,8 +7063,8 @@
         </p:nvSpPr>
         <p:spPr>
           <a:xfrm>
-            <a:off x="7219424" y="5294916"/>
-            <a:ext cx="3487062" cy="1015663"/>
+            <a:off x="7220304" y="5051396"/>
+            <a:ext cx="3172641" cy="1231106"/>
           </a:xfrm>
           <a:prstGeom prst="rect">
             <a:avLst/>
@@ -6912,31 +7096,46 @@
           <a:p>
             <a:pPr algn="ctr"/>
             <a:r>
-              <a:rPr lang="en-US" sz="2000" dirty="0"/>
+              <a:rPr lang="en-US" dirty="0"/>
               <a:t>-2.1 </a:t>
             </a:r>
             <a:r>
-              <a:rPr lang="en-US" sz="2000" dirty="0" err="1"/>
+              <a:rPr lang="en-US" dirty="0" err="1"/>
               <a:t>maf</a:t>
             </a:r>
             <a:r>
-              <a:rPr lang="en-US" sz="2000" dirty="0"/>
+              <a:rPr lang="en-US" dirty="0"/>
               <a:t> Oct. 2019 to Sep. 2020</a:t>
             </a:r>
           </a:p>
           <a:p>
             <a:pPr algn="ctr"/>
             <a:r>
-              <a:rPr lang="en-US" sz="2000" dirty="0"/>
+              <a:rPr lang="en-US" dirty="0"/>
               <a:t>-3.8 </a:t>
             </a:r>
             <a:r>
-              <a:rPr lang="en-US" sz="2000" dirty="0" err="1"/>
+              <a:rPr lang="en-US" dirty="0" err="1"/>
               <a:t>maf</a:t>
             </a:r>
             <a:r>
-              <a:rPr lang="en-US" sz="2000" dirty="0"/>
+              <a:rPr lang="en-US" dirty="0"/>
               <a:t> Oct. 2020 to Sep. 2021</a:t>
+            </a:r>
+          </a:p>
+          <a:p>
+            <a:pPr algn="ctr"/>
+            <a:r>
+              <a:rPr lang="en-US" dirty="0"/>
+              <a:t>-1.4 </a:t>
+            </a:r>
+            <a:r>
+              <a:rPr lang="en-US" dirty="0" err="1"/>
+              <a:t>maf</a:t>
+            </a:r>
+            <a:r>
+              <a:rPr lang="en-US" dirty="0"/>
+              <a:t> Oct. 2021 to Mar. 2022</a:t>
             </a:r>
           </a:p>
         </p:txBody>
@@ -6944,7 +7143,7 @@
     </p:spTree>
     <p:extLst>
       <p:ext uri="{BB962C8B-B14F-4D97-AF65-F5344CB8AC3E}">
-        <p14:creationId xmlns:p14="http://schemas.microsoft.com/office/powerpoint/2010/main" val="1679956396"/>
+        <p14:creationId xmlns:p14="http://schemas.microsoft.com/office/powerpoint/2010/main" val="2483491803"/>
       </p:ext>
     </p:extLst>
   </p:cSld>

</xml_diff>

<commit_message>
Update Drought Response Operations to recently announced 0.5 maf release from Flaming Gorge
</commit_message>
<xml_diff>
--- a/ProtectPowellInBrief/ProtectLakePowellInBrief-DataAssembly.pptx
+++ b/ProtectPowellInBrief/ProtectLakePowellInBrief-DataAssembly.pptx
@@ -260,7 +260,7 @@
           <a:p>
             <a:fld id="{DADD071D-6307-46EF-8484-8AD6D8EF0DAB}" type="datetimeFigureOut">
               <a:rPr lang="en-US" smtClean="0"/>
-              <a:t>4/14/2022</a:t>
+              <a:t>4/21/2022</a:t>
             </a:fld>
             <a:endParaRPr lang="en-US"/>
           </a:p>
@@ -458,7 +458,7 @@
           <a:p>
             <a:fld id="{DADD071D-6307-46EF-8484-8AD6D8EF0DAB}" type="datetimeFigureOut">
               <a:rPr lang="en-US" smtClean="0"/>
-              <a:t>4/14/2022</a:t>
+              <a:t>4/21/2022</a:t>
             </a:fld>
             <a:endParaRPr lang="en-US"/>
           </a:p>
@@ -666,7 +666,7 @@
           <a:p>
             <a:fld id="{DADD071D-6307-46EF-8484-8AD6D8EF0DAB}" type="datetimeFigureOut">
               <a:rPr lang="en-US" smtClean="0"/>
-              <a:t>4/14/2022</a:t>
+              <a:t>4/21/2022</a:t>
             </a:fld>
             <a:endParaRPr lang="en-US"/>
           </a:p>
@@ -864,7 +864,7 @@
           <a:p>
             <a:fld id="{DADD071D-6307-46EF-8484-8AD6D8EF0DAB}" type="datetimeFigureOut">
               <a:rPr lang="en-US" smtClean="0"/>
-              <a:t>4/14/2022</a:t>
+              <a:t>4/21/2022</a:t>
             </a:fld>
             <a:endParaRPr lang="en-US"/>
           </a:p>
@@ -1139,7 +1139,7 @@
           <a:p>
             <a:fld id="{DADD071D-6307-46EF-8484-8AD6D8EF0DAB}" type="datetimeFigureOut">
               <a:rPr lang="en-US" smtClean="0"/>
-              <a:t>4/14/2022</a:t>
+              <a:t>4/21/2022</a:t>
             </a:fld>
             <a:endParaRPr lang="en-US"/>
           </a:p>
@@ -1404,7 +1404,7 @@
           <a:p>
             <a:fld id="{DADD071D-6307-46EF-8484-8AD6D8EF0DAB}" type="datetimeFigureOut">
               <a:rPr lang="en-US" smtClean="0"/>
-              <a:t>4/14/2022</a:t>
+              <a:t>4/21/2022</a:t>
             </a:fld>
             <a:endParaRPr lang="en-US"/>
           </a:p>
@@ -1816,7 +1816,7 @@
           <a:p>
             <a:fld id="{DADD071D-6307-46EF-8484-8AD6D8EF0DAB}" type="datetimeFigureOut">
               <a:rPr lang="en-US" smtClean="0"/>
-              <a:t>4/14/2022</a:t>
+              <a:t>4/21/2022</a:t>
             </a:fld>
             <a:endParaRPr lang="en-US"/>
           </a:p>
@@ -1957,7 +1957,7 @@
           <a:p>
             <a:fld id="{DADD071D-6307-46EF-8484-8AD6D8EF0DAB}" type="datetimeFigureOut">
               <a:rPr lang="en-US" smtClean="0"/>
-              <a:t>4/14/2022</a:t>
+              <a:t>4/21/2022</a:t>
             </a:fld>
             <a:endParaRPr lang="en-US"/>
           </a:p>
@@ -2070,7 +2070,7 @@
           <a:p>
             <a:fld id="{DADD071D-6307-46EF-8484-8AD6D8EF0DAB}" type="datetimeFigureOut">
               <a:rPr lang="en-US" smtClean="0"/>
-              <a:t>4/14/2022</a:t>
+              <a:t>4/21/2022</a:t>
             </a:fld>
             <a:endParaRPr lang="en-US"/>
           </a:p>
@@ -2381,7 +2381,7 @@
           <a:p>
             <a:fld id="{DADD071D-6307-46EF-8484-8AD6D8EF0DAB}" type="datetimeFigureOut">
               <a:rPr lang="en-US" smtClean="0"/>
-              <a:t>4/14/2022</a:t>
+              <a:t>4/21/2022</a:t>
             </a:fld>
             <a:endParaRPr lang="en-US"/>
           </a:p>
@@ -2669,7 +2669,7 @@
           <a:p>
             <a:fld id="{DADD071D-6307-46EF-8484-8AD6D8EF0DAB}" type="datetimeFigureOut">
               <a:rPr lang="en-US" smtClean="0"/>
-              <a:t>4/14/2022</a:t>
+              <a:t>4/21/2022</a:t>
             </a:fld>
             <a:endParaRPr lang="en-US"/>
           </a:p>
@@ -2910,7 +2910,7 @@
           <a:p>
             <a:fld id="{DADD071D-6307-46EF-8484-8AD6D8EF0DAB}" type="datetimeFigureOut">
               <a:rPr lang="en-US" smtClean="0"/>
-              <a:t>4/14/2022</a:t>
+              <a:t>4/21/2022</a:t>
             </a:fld>
             <a:endParaRPr lang="en-US"/>
           </a:p>
@@ -3529,7 +3529,7 @@
                   <a:srgbClr val="7030A0"/>
                 </a:solidFill>
               </a:rPr>
-              <a:t>&lt; 1 </a:t>
+              <a:t>0.5 </a:t>
             </a:r>
             <a:r>
               <a:rPr lang="en-US" sz="2000" dirty="0" err="1">
@@ -5551,12 +5551,12 @@
           <a:p>
             <a:pPr algn="ctr"/>
             <a:r>
-              <a:rPr lang="en-US" sz="2000" dirty="0">
+              <a:rPr lang="en-US" sz="2000">
                 <a:solidFill>
                   <a:srgbClr val="7030A0"/>
                 </a:solidFill>
               </a:rPr>
-              <a:t>&lt; 1 </a:t>
+              <a:t>0.5 </a:t>
             </a:r>
             <a:r>
               <a:rPr lang="en-US" sz="2000" dirty="0" err="1">

</xml_diff>

<commit_message>
Update data to April 21, 2022
</commit_message>
<xml_diff>
--- a/ProtectPowellInBrief/ProtectLakePowellInBrief-DataAssembly.pptx
+++ b/ProtectPowellInBrief/ProtectLakePowellInBrief-DataAssembly.pptx
@@ -3451,7 +3451,7 @@
                   <a:srgbClr val="7030A0"/>
                 </a:solidFill>
               </a:rPr>
-              <a:t>5.2 – 6.6 </a:t>
+              <a:t>5.3 – 6.3 </a:t>
             </a:r>
             <a:r>
               <a:rPr lang="en-US" sz="2000" dirty="0" err="1">
@@ -4101,7 +4101,7 @@
             <a:pPr algn="ctr"/>
             <a:r>
               <a:rPr lang="en-US" sz="1600" b="1" dirty="0"/>
-              <a:t>Values for March 30, 2022</a:t>
+              <a:t>Values for April 21, 2022</a:t>
             </a:r>
           </a:p>
           <a:p>
@@ -5473,12 +5473,20 @@
           <a:p>
             <a:pPr algn="ctr"/>
             <a:r>
+              <a:rPr lang="en-US" sz="2000">
+                <a:solidFill>
+                  <a:srgbClr val="7030A0"/>
+                </a:solidFill>
+              </a:rPr>
+              <a:t>5.3 </a:t>
+            </a:r>
+            <a:r>
               <a:rPr lang="en-US" sz="2000" dirty="0">
                 <a:solidFill>
                   <a:srgbClr val="7030A0"/>
                 </a:solidFill>
               </a:rPr>
-              <a:t>5.2 – 6.6 </a:t>
+              <a:t>– 6.3 </a:t>
             </a:r>
             <a:r>
               <a:rPr lang="en-US" sz="2000" dirty="0" err="1">
@@ -6128,7 +6136,7 @@
             <a:pPr algn="ctr"/>
             <a:r>
               <a:rPr lang="en-US" sz="1600" b="1" dirty="0"/>
-              <a:t>Values for March 30, 2022</a:t>
+              <a:t>Values for April 21, 2022</a:t>
             </a:r>
           </a:p>
           <a:p>

</xml_diff>

<commit_message>
Update model file and readme to Colorado River Basin Accounts
</commit_message>
<xml_diff>
--- a/ProtectPowellInBrief/ProtectLakePowellInBrief-DataAssembly.pptx
+++ b/ProtectPowellInBrief/ProtectLakePowellInBrief-DataAssembly.pptx
@@ -260,7 +260,7 @@
           <a:p>
             <a:fld id="{DADD071D-6307-46EF-8484-8AD6D8EF0DAB}" type="datetimeFigureOut">
               <a:rPr lang="en-US" smtClean="0"/>
-              <a:t>4/21/2022</a:t>
+              <a:t>4/22/2022</a:t>
             </a:fld>
             <a:endParaRPr lang="en-US"/>
           </a:p>
@@ -458,7 +458,7 @@
           <a:p>
             <a:fld id="{DADD071D-6307-46EF-8484-8AD6D8EF0DAB}" type="datetimeFigureOut">
               <a:rPr lang="en-US" smtClean="0"/>
-              <a:t>4/21/2022</a:t>
+              <a:t>4/22/2022</a:t>
             </a:fld>
             <a:endParaRPr lang="en-US"/>
           </a:p>
@@ -666,7 +666,7 @@
           <a:p>
             <a:fld id="{DADD071D-6307-46EF-8484-8AD6D8EF0DAB}" type="datetimeFigureOut">
               <a:rPr lang="en-US" smtClean="0"/>
-              <a:t>4/21/2022</a:t>
+              <a:t>4/22/2022</a:t>
             </a:fld>
             <a:endParaRPr lang="en-US"/>
           </a:p>
@@ -864,7 +864,7 @@
           <a:p>
             <a:fld id="{DADD071D-6307-46EF-8484-8AD6D8EF0DAB}" type="datetimeFigureOut">
               <a:rPr lang="en-US" smtClean="0"/>
-              <a:t>4/21/2022</a:t>
+              <a:t>4/22/2022</a:t>
             </a:fld>
             <a:endParaRPr lang="en-US"/>
           </a:p>
@@ -1139,7 +1139,7 @@
           <a:p>
             <a:fld id="{DADD071D-6307-46EF-8484-8AD6D8EF0DAB}" type="datetimeFigureOut">
               <a:rPr lang="en-US" smtClean="0"/>
-              <a:t>4/21/2022</a:t>
+              <a:t>4/22/2022</a:t>
             </a:fld>
             <a:endParaRPr lang="en-US"/>
           </a:p>
@@ -1404,7 +1404,7 @@
           <a:p>
             <a:fld id="{DADD071D-6307-46EF-8484-8AD6D8EF0DAB}" type="datetimeFigureOut">
               <a:rPr lang="en-US" smtClean="0"/>
-              <a:t>4/21/2022</a:t>
+              <a:t>4/22/2022</a:t>
             </a:fld>
             <a:endParaRPr lang="en-US"/>
           </a:p>
@@ -1816,7 +1816,7 @@
           <a:p>
             <a:fld id="{DADD071D-6307-46EF-8484-8AD6D8EF0DAB}" type="datetimeFigureOut">
               <a:rPr lang="en-US" smtClean="0"/>
-              <a:t>4/21/2022</a:t>
+              <a:t>4/22/2022</a:t>
             </a:fld>
             <a:endParaRPr lang="en-US"/>
           </a:p>
@@ -1957,7 +1957,7 @@
           <a:p>
             <a:fld id="{DADD071D-6307-46EF-8484-8AD6D8EF0DAB}" type="datetimeFigureOut">
               <a:rPr lang="en-US" smtClean="0"/>
-              <a:t>4/21/2022</a:t>
+              <a:t>4/22/2022</a:t>
             </a:fld>
             <a:endParaRPr lang="en-US"/>
           </a:p>
@@ -2070,7 +2070,7 @@
           <a:p>
             <a:fld id="{DADD071D-6307-46EF-8484-8AD6D8EF0DAB}" type="datetimeFigureOut">
               <a:rPr lang="en-US" smtClean="0"/>
-              <a:t>4/21/2022</a:t>
+              <a:t>4/22/2022</a:t>
             </a:fld>
             <a:endParaRPr lang="en-US"/>
           </a:p>
@@ -2381,7 +2381,7 @@
           <a:p>
             <a:fld id="{DADD071D-6307-46EF-8484-8AD6D8EF0DAB}" type="datetimeFigureOut">
               <a:rPr lang="en-US" smtClean="0"/>
-              <a:t>4/21/2022</a:t>
+              <a:t>4/22/2022</a:t>
             </a:fld>
             <a:endParaRPr lang="en-US"/>
           </a:p>
@@ -2669,7 +2669,7 @@
           <a:p>
             <a:fld id="{DADD071D-6307-46EF-8484-8AD6D8EF0DAB}" type="datetimeFigureOut">
               <a:rPr lang="en-US" smtClean="0"/>
-              <a:t>4/21/2022</a:t>
+              <a:t>4/22/2022</a:t>
             </a:fld>
             <a:endParaRPr lang="en-US"/>
           </a:p>
@@ -2910,7 +2910,7 @@
           <a:p>
             <a:fld id="{DADD071D-6307-46EF-8484-8AD6D8EF0DAB}" type="datetimeFigureOut">
               <a:rPr lang="en-US" smtClean="0"/>
-              <a:t>4/21/2022</a:t>
+              <a:t>4/22/2022</a:t>
             </a:fld>
             <a:endParaRPr lang="en-US"/>
           </a:p>
@@ -7148,6 +7148,123 @@
           </a:p>
         </p:txBody>
       </p:sp>
+      <p:cxnSp>
+        <p:nvCxnSpPr>
+          <p:cNvPr id="38" name="Straight Connector 37">
+            <a:extLst>
+              <a:ext uri="{FF2B5EF4-FFF2-40B4-BE49-F238E27FC236}">
+                <a16:creationId xmlns:a16="http://schemas.microsoft.com/office/drawing/2014/main" id="{44D526CD-C358-4F3A-8578-36D3F66BA347}"/>
+              </a:ext>
+            </a:extLst>
+          </p:cNvPr>
+          <p:cNvCxnSpPr>
+            <a:cxnSpLocks/>
+          </p:cNvCxnSpPr>
+          <p:nvPr/>
+        </p:nvCxnSpPr>
+        <p:spPr>
+          <a:xfrm>
+            <a:off x="5130945" y="3205004"/>
+            <a:ext cx="1779654" cy="0"/>
+          </a:xfrm>
+          <a:prstGeom prst="line">
+            <a:avLst/>
+          </a:prstGeom>
+          <a:ln>
+            <a:solidFill>
+              <a:schemeClr val="tx1"/>
+            </a:solidFill>
+            <a:prstDash val="dash"/>
+          </a:ln>
+        </p:spPr>
+        <p:style>
+          <a:lnRef idx="1">
+            <a:schemeClr val="accent1"/>
+          </a:lnRef>
+          <a:fillRef idx="0">
+            <a:schemeClr val="accent1"/>
+          </a:fillRef>
+          <a:effectRef idx="0">
+            <a:schemeClr val="accent1"/>
+          </a:effectRef>
+          <a:fontRef idx="minor">
+            <a:schemeClr val="tx1"/>
+          </a:fontRef>
+        </p:style>
+      </p:cxnSp>
+      <p:sp>
+        <p:nvSpPr>
+          <p:cNvPr id="42" name="Rectangle 41">
+            <a:extLst>
+              <a:ext uri="{FF2B5EF4-FFF2-40B4-BE49-F238E27FC236}">
+                <a16:creationId xmlns:a16="http://schemas.microsoft.com/office/drawing/2014/main" id="{13E0B1FA-BFA7-4C3A-AFD7-1E826D22D850}"/>
+              </a:ext>
+            </a:extLst>
+          </p:cNvPr>
+          <p:cNvSpPr/>
+          <p:nvPr/>
+        </p:nvSpPr>
+        <p:spPr>
+          <a:xfrm>
+            <a:off x="6861234" y="3045474"/>
+            <a:ext cx="1957191" cy="307777"/>
+          </a:xfrm>
+          <a:prstGeom prst="rect">
+            <a:avLst/>
+          </a:prstGeom>
+        </p:spPr>
+        <p:txBody>
+          <a:bodyPr wrap="square">
+            <a:spAutoFit/>
+          </a:bodyPr>
+          <a:lstStyle/>
+          <a:p>
+            <a:r>
+              <a:rPr lang="en-US" sz="1400" dirty="0">
+                <a:solidFill>
+                  <a:schemeClr val="accent2"/>
+                </a:solidFill>
+              </a:rPr>
+              <a:t>7.2 – Oct. 1, 2021 level</a:t>
+            </a:r>
+          </a:p>
+        </p:txBody>
+      </p:sp>
+      <p:sp>
+        <p:nvSpPr>
+          <p:cNvPr id="43" name="Rectangle 42">
+            <a:extLst>
+              <a:ext uri="{FF2B5EF4-FFF2-40B4-BE49-F238E27FC236}">
+                <a16:creationId xmlns:a16="http://schemas.microsoft.com/office/drawing/2014/main" id="{75509AA0-76D8-4B32-B700-32FE7B38D1D1}"/>
+              </a:ext>
+            </a:extLst>
+          </p:cNvPr>
+          <p:cNvSpPr/>
+          <p:nvPr/>
+        </p:nvSpPr>
+        <p:spPr>
+          <a:xfrm>
+            <a:off x="4546516" y="3054240"/>
+            <a:ext cx="595036" cy="307777"/>
+          </a:xfrm>
+          <a:prstGeom prst="rect">
+            <a:avLst/>
+          </a:prstGeom>
+        </p:spPr>
+        <p:txBody>
+          <a:bodyPr wrap="none">
+            <a:spAutoFit/>
+          </a:bodyPr>
+          <a:lstStyle/>
+          <a:p>
+            <a:pPr algn="ctr"/>
+            <a:r>
+              <a:rPr lang="en-US" sz="1400" dirty="0"/>
+              <a:t>3,544</a:t>
+            </a:r>
+          </a:p>
+        </p:txBody>
+      </p:sp>
     </p:spTree>
     <p:extLst>
       <p:ext uri="{BB962C8B-B14F-4D97-AF65-F5344CB8AC3E}">

</xml_diff>